<commit_message>
prep for cfg slides
</commit_message>
<xml_diff>
--- a/assets/ppt/cfg/cfg1-intro.pptx
+++ b/assets/ppt/cfg/cfg1-intro.pptx
@@ -5,10 +5,10 @@
     <p:sldMasterId id="2147483648" r:id="rId1"/>
   </p:sldMasterIdLst>
   <p:notesMasterIdLst>
-    <p:notesMasterId r:id="rId20"/>
+    <p:notesMasterId r:id="rId19"/>
   </p:notesMasterIdLst>
   <p:handoutMasterIdLst>
-    <p:handoutMasterId r:id="rId21"/>
+    <p:handoutMasterId r:id="rId20"/>
   </p:handoutMasterIdLst>
   <p:sldIdLst>
     <p:sldId id="328" r:id="rId2"/>
@@ -25,10 +25,9 @@
     <p:sldId id="318" r:id="rId13"/>
     <p:sldId id="319" r:id="rId14"/>
     <p:sldId id="324" r:id="rId15"/>
-    <p:sldId id="308" r:id="rId16"/>
-    <p:sldId id="325" r:id="rId17"/>
-    <p:sldId id="326" r:id="rId18"/>
-    <p:sldId id="327" r:id="rId19"/>
+    <p:sldId id="325" r:id="rId16"/>
+    <p:sldId id="326" r:id="rId17"/>
+    <p:sldId id="327" r:id="rId18"/>
   </p:sldIdLst>
   <p:sldSz cx="9144000" cy="6858000" type="screen4x3"/>
   <p:notesSz cx="6858000" cy="9144000"/>
@@ -157,6 +156,22 @@
       </a:defRPr>
     </a:lvl9pPr>
   </p:defaultTextStyle>
+  <p:extLst>
+    <p:ext uri="{EFAFB233-063F-42B5-8137-9DF3F51BA10A}">
+      <p15:sldGuideLst xmlns:p15="http://schemas.microsoft.com/office/powerpoint/2012/main">
+        <p15:guide id="1" orient="horz" pos="2160">
+          <p15:clr>
+            <a:srgbClr val="A4A3A4"/>
+          </p15:clr>
+        </p15:guide>
+        <p15:guide id="2" pos="2880">
+          <p15:clr>
+            <a:srgbClr val="A4A3A4"/>
+          </p15:clr>
+        </p15:guide>
+      </p15:sldGuideLst>
+    </p:ext>
+  </p:extLst>
 </p:presentation>
 </file>
 
@@ -1407,7 +1422,7 @@
             <a:fld id="{5EB415FA-3C37-834A-A1E6-2A4C5B46A4CD}" type="slidenum">
               <a:rPr lang="en-US"/>
               <a:pPr/>
-              <a:t>16</a:t>
+              <a:t>15</a:t>
             </a:fld>
             <a:endParaRPr lang="en-US"/>
           </a:p>
@@ -1491,7 +1506,7 @@
             <a:fld id="{6F9787EC-BAFE-294A-8E90-66F7022EC2DD}" type="slidenum">
               <a:rPr lang="en-US"/>
               <a:pPr/>
-              <a:t>17</a:t>
+              <a:t>16</a:t>
             </a:fld>
             <a:endParaRPr lang="en-US"/>
           </a:p>
@@ -1575,7 +1590,7 @@
             <a:fld id="{396E42E6-9B4D-EC4C-A832-87241DDF3C93}" type="slidenum">
               <a:rPr lang="en-US"/>
               <a:pPr/>
-              <a:t>18</a:t>
+              <a:t>17</a:t>
             </a:fld>
             <a:endParaRPr lang="en-US"/>
           </a:p>
@@ -1660,7 +1675,7 @@
           <a:lstStyle/>
           <a:p>
             <a:r>
-              <a:rPr lang="en-CA" smtClean="0"/>
+              <a:rPr lang="en-CA"/>
               <a:t>Click to edit Master title style</a:t>
             </a:r>
             <a:endParaRPr lang="en-US"/>
@@ -1725,7 +1740,7 @@
           </a:lstStyle>
           <a:p>
             <a:r>
-              <a:rPr lang="en-CA" smtClean="0"/>
+              <a:rPr lang="en-CA"/>
               <a:t>Click to edit Master subtitle style</a:t>
             </a:r>
             <a:endParaRPr lang="en-US"/>
@@ -1742,7 +1757,15 @@
             <p:ph type="dt" sz="half" idx="10"/>
           </p:nvPr>
         </p:nvSpPr>
-        <p:spPr/>
+        <p:spPr>
+          <a:xfrm>
+            <a:off x="685800" y="6248400"/>
+            <a:ext cx="1905000" cy="457200"/>
+          </a:xfrm>
+          <a:prstGeom prst="rect">
+            <a:avLst/>
+          </a:prstGeom>
+        </p:spPr>
         <p:txBody>
           <a:bodyPr/>
           <a:lstStyle>
@@ -1754,7 +1777,7 @@
             <a:fld id="{BB10D2A1-AA16-124C-8724-E871FC52E9A7}" type="datetime1">
               <a:rPr lang="en-US"/>
               <a:pPr/>
-              <a:t>16-06-14</a:t>
+              <a:t>5/29/19</a:t>
             </a:fld>
             <a:endParaRPr lang="en-US"/>
           </a:p>
@@ -1770,7 +1793,15 @@
             <p:ph type="ftr" sz="quarter" idx="11"/>
           </p:nvPr>
         </p:nvSpPr>
-        <p:spPr/>
+        <p:spPr>
+          <a:xfrm>
+            <a:off x="3124200" y="6248400"/>
+            <a:ext cx="2895600" cy="457200"/>
+          </a:xfrm>
+          <a:prstGeom prst="rect">
+            <a:avLst/>
+          </a:prstGeom>
+        </p:spPr>
         <p:txBody>
           <a:bodyPr/>
           <a:lstStyle>
@@ -1852,7 +1883,7 @@
           <a:lstStyle/>
           <a:p>
             <a:r>
-              <a:rPr lang="en-CA" smtClean="0"/>
+              <a:rPr lang="en-CA"/>
               <a:t>Click to edit Master title style</a:t>
             </a:r>
             <a:endParaRPr lang="en-US"/>
@@ -1876,35 +1907,35 @@
           <a:p>
             <a:pPr lvl="0"/>
             <a:r>
-              <a:rPr lang="en-CA" smtClean="0"/>
+              <a:rPr lang="en-CA"/>
               <a:t>Click to edit Master text styles</a:t>
             </a:r>
           </a:p>
           <a:p>
             <a:pPr lvl="1"/>
             <a:r>
-              <a:rPr lang="en-CA" smtClean="0"/>
+              <a:rPr lang="en-CA"/>
               <a:t>Second level</a:t>
             </a:r>
           </a:p>
           <a:p>
             <a:pPr lvl="2"/>
             <a:r>
-              <a:rPr lang="en-CA" smtClean="0"/>
+              <a:rPr lang="en-CA"/>
               <a:t>Third level</a:t>
             </a:r>
           </a:p>
           <a:p>
             <a:pPr lvl="3"/>
             <a:r>
-              <a:rPr lang="en-CA" smtClean="0"/>
+              <a:rPr lang="en-CA"/>
               <a:t>Fourth level</a:t>
             </a:r>
           </a:p>
           <a:p>
             <a:pPr lvl="4"/>
             <a:r>
-              <a:rPr lang="en-CA" smtClean="0"/>
+              <a:rPr lang="en-CA"/>
               <a:t>Fifth level</a:t>
             </a:r>
             <a:endParaRPr lang="en-US"/>
@@ -1921,7 +1952,15 @@
             <p:ph type="dt" sz="half" idx="10"/>
           </p:nvPr>
         </p:nvSpPr>
-        <p:spPr/>
+        <p:spPr>
+          <a:xfrm>
+            <a:off x="685800" y="6248400"/>
+            <a:ext cx="1905000" cy="457200"/>
+          </a:xfrm>
+          <a:prstGeom prst="rect">
+            <a:avLst/>
+          </a:prstGeom>
+        </p:spPr>
         <p:txBody>
           <a:bodyPr/>
           <a:lstStyle>
@@ -1933,7 +1972,7 @@
             <a:fld id="{1785DF61-96F8-3448-B30E-7E61CA41DDB4}" type="datetime1">
               <a:rPr lang="en-US"/>
               <a:pPr/>
-              <a:t>16-06-14</a:t>
+              <a:t>5/29/19</a:t>
             </a:fld>
             <a:endParaRPr lang="en-US"/>
           </a:p>
@@ -1949,7 +1988,15 @@
             <p:ph type="ftr" sz="quarter" idx="11"/>
           </p:nvPr>
         </p:nvSpPr>
-        <p:spPr/>
+        <p:spPr>
+          <a:xfrm>
+            <a:off x="3124200" y="6248400"/>
+            <a:ext cx="2895600" cy="457200"/>
+          </a:xfrm>
+          <a:prstGeom prst="rect">
+            <a:avLst/>
+          </a:prstGeom>
+        </p:spPr>
         <p:txBody>
           <a:bodyPr/>
           <a:lstStyle>
@@ -2036,7 +2083,7 @@
           <a:lstStyle/>
           <a:p>
             <a:r>
-              <a:rPr lang="en-CA" smtClean="0"/>
+              <a:rPr lang="en-CA"/>
               <a:t>Click to edit Master title style</a:t>
             </a:r>
             <a:endParaRPr lang="en-US"/>
@@ -2065,35 +2112,35 @@
           <a:p>
             <a:pPr lvl="0"/>
             <a:r>
-              <a:rPr lang="en-CA" smtClean="0"/>
+              <a:rPr lang="en-CA"/>
               <a:t>Click to edit Master text styles</a:t>
             </a:r>
           </a:p>
           <a:p>
             <a:pPr lvl="1"/>
             <a:r>
-              <a:rPr lang="en-CA" smtClean="0"/>
+              <a:rPr lang="en-CA"/>
               <a:t>Second level</a:t>
             </a:r>
           </a:p>
           <a:p>
             <a:pPr lvl="2"/>
             <a:r>
-              <a:rPr lang="en-CA" smtClean="0"/>
+              <a:rPr lang="en-CA"/>
               <a:t>Third level</a:t>
             </a:r>
           </a:p>
           <a:p>
             <a:pPr lvl="3"/>
             <a:r>
-              <a:rPr lang="en-CA" smtClean="0"/>
+              <a:rPr lang="en-CA"/>
               <a:t>Fourth level</a:t>
             </a:r>
           </a:p>
           <a:p>
             <a:pPr lvl="4"/>
             <a:r>
-              <a:rPr lang="en-CA" smtClean="0"/>
+              <a:rPr lang="en-CA"/>
               <a:t>Fifth level</a:t>
             </a:r>
             <a:endParaRPr lang="en-US"/>
@@ -2110,7 +2157,15 @@
             <p:ph type="dt" sz="half" idx="10"/>
           </p:nvPr>
         </p:nvSpPr>
-        <p:spPr/>
+        <p:spPr>
+          <a:xfrm>
+            <a:off x="685800" y="6248400"/>
+            <a:ext cx="1905000" cy="457200"/>
+          </a:xfrm>
+          <a:prstGeom prst="rect">
+            <a:avLst/>
+          </a:prstGeom>
+        </p:spPr>
         <p:txBody>
           <a:bodyPr/>
           <a:lstStyle>
@@ -2122,7 +2177,7 @@
             <a:fld id="{B00C37A4-5AA0-6C4C-B4C1-05BACFD89896}" type="datetime1">
               <a:rPr lang="en-US"/>
               <a:pPr/>
-              <a:t>16-06-14</a:t>
+              <a:t>5/29/19</a:t>
             </a:fld>
             <a:endParaRPr lang="en-US"/>
           </a:p>
@@ -2138,7 +2193,15 @@
             <p:ph type="ftr" sz="quarter" idx="11"/>
           </p:nvPr>
         </p:nvSpPr>
-        <p:spPr/>
+        <p:spPr>
+          <a:xfrm>
+            <a:off x="3124200" y="6248400"/>
+            <a:ext cx="2895600" cy="457200"/>
+          </a:xfrm>
+          <a:prstGeom prst="rect">
+            <a:avLst/>
+          </a:prstGeom>
+        </p:spPr>
         <p:txBody>
           <a:bodyPr/>
           <a:lstStyle>
@@ -2220,7 +2283,7 @@
           <a:lstStyle/>
           <a:p>
             <a:r>
-              <a:rPr lang="en-CA" smtClean="0"/>
+              <a:rPr lang="en-CA"/>
               <a:t>Click to edit Master title style</a:t>
             </a:r>
             <a:endParaRPr lang="en-US"/>
@@ -2244,65 +2307,37 @@
           <a:p>
             <a:pPr lvl="0"/>
             <a:r>
-              <a:rPr lang="en-CA" smtClean="0"/>
+              <a:rPr lang="en-CA"/>
               <a:t>Click to edit Master text styles</a:t>
             </a:r>
           </a:p>
           <a:p>
             <a:pPr lvl="1"/>
             <a:r>
-              <a:rPr lang="en-CA" smtClean="0"/>
+              <a:rPr lang="en-CA"/>
               <a:t>Second level</a:t>
             </a:r>
           </a:p>
           <a:p>
             <a:pPr lvl="2"/>
             <a:r>
-              <a:rPr lang="en-CA" smtClean="0"/>
+              <a:rPr lang="en-CA"/>
               <a:t>Third level</a:t>
             </a:r>
           </a:p>
           <a:p>
             <a:pPr lvl="3"/>
             <a:r>
-              <a:rPr lang="en-CA" smtClean="0"/>
+              <a:rPr lang="en-CA"/>
               <a:t>Fourth level</a:t>
             </a:r>
           </a:p>
           <a:p>
             <a:pPr lvl="4"/>
             <a:r>
-              <a:rPr lang="en-CA" smtClean="0"/>
+              <a:rPr lang="en-CA"/>
               <a:t>Fifth level</a:t>
             </a:r>
-            <a:endParaRPr lang="en-US"/>
-          </a:p>
-        </p:txBody>
-      </p:sp>
-      <p:sp>
-        <p:nvSpPr>
-          <p:cNvPr id="4" name="Date Placeholder 3"/>
-          <p:cNvSpPr>
-            <a:spLocks noGrp="1"/>
-          </p:cNvSpPr>
-          <p:nvPr>
-            <p:ph type="dt" sz="half" idx="10"/>
-          </p:nvPr>
-        </p:nvSpPr>
-        <p:spPr/>
-        <p:txBody>
-          <a:bodyPr/>
-          <a:lstStyle>
-            <a:lvl1pPr>
-              <a:defRPr smtClean="0"/>
-            </a:lvl1pPr>
-          </a:lstStyle>
-          <a:p>
-            <a:fld id="{F668E4B5-49D5-B048-B5A5-3831D6A375F6}" type="datetime1">
-              <a:rPr lang="en-US"/>
-              <a:pPr/>
-              <a:t>16-06-14</a:t>
-            </a:fld>
             <a:endParaRPr lang="en-US"/>
           </a:p>
         </p:txBody>
@@ -2317,7 +2352,15 @@
             <p:ph type="ftr" sz="quarter" idx="11"/>
           </p:nvPr>
         </p:nvSpPr>
-        <p:spPr/>
+        <p:spPr>
+          <a:xfrm>
+            <a:off x="3124200" y="6248400"/>
+            <a:ext cx="2895600" cy="457200"/>
+          </a:xfrm>
+          <a:prstGeom prst="rect">
+            <a:avLst/>
+          </a:prstGeom>
+        </p:spPr>
         <p:txBody>
           <a:bodyPr/>
           <a:lstStyle>
@@ -2408,7 +2451,7 @@
           </a:lstStyle>
           <a:p>
             <a:r>
-              <a:rPr lang="en-CA" smtClean="0"/>
+              <a:rPr lang="en-CA"/>
               <a:t>Click to edit Master title style</a:t>
             </a:r>
             <a:endParaRPr lang="en-US"/>
@@ -2474,7 +2517,7 @@
           <a:p>
             <a:pPr lvl="0"/>
             <a:r>
-              <a:rPr lang="en-CA" smtClean="0"/>
+              <a:rPr lang="en-CA"/>
               <a:t>Click to edit Master text styles</a:t>
             </a:r>
           </a:p>
@@ -2490,7 +2533,15 @@
             <p:ph type="dt" sz="half" idx="10"/>
           </p:nvPr>
         </p:nvSpPr>
-        <p:spPr/>
+        <p:spPr>
+          <a:xfrm>
+            <a:off x="685800" y="6248400"/>
+            <a:ext cx="1905000" cy="457200"/>
+          </a:xfrm>
+          <a:prstGeom prst="rect">
+            <a:avLst/>
+          </a:prstGeom>
+        </p:spPr>
         <p:txBody>
           <a:bodyPr/>
           <a:lstStyle>
@@ -2502,7 +2553,7 @@
             <a:fld id="{7ACDE087-5547-9146-A44C-F12479CD90F2}" type="datetime1">
               <a:rPr lang="en-US"/>
               <a:pPr/>
-              <a:t>16-06-14</a:t>
+              <a:t>5/29/19</a:t>
             </a:fld>
             <a:endParaRPr lang="en-US"/>
           </a:p>
@@ -2518,7 +2569,15 @@
             <p:ph type="ftr" sz="quarter" idx="11"/>
           </p:nvPr>
         </p:nvSpPr>
-        <p:spPr/>
+        <p:spPr>
+          <a:xfrm>
+            <a:off x="3124200" y="6248400"/>
+            <a:ext cx="2895600" cy="457200"/>
+          </a:xfrm>
+          <a:prstGeom prst="rect">
+            <a:avLst/>
+          </a:prstGeom>
+        </p:spPr>
         <p:txBody>
           <a:bodyPr/>
           <a:lstStyle>
@@ -2600,7 +2659,7 @@
           <a:lstStyle/>
           <a:p>
             <a:r>
-              <a:rPr lang="en-CA" smtClean="0"/>
+              <a:rPr lang="en-CA"/>
               <a:t>Click to edit Master title style</a:t>
             </a:r>
             <a:endParaRPr lang="en-US"/>
@@ -2657,35 +2716,35 @@
           <a:p>
             <a:pPr lvl="0"/>
             <a:r>
-              <a:rPr lang="en-CA" smtClean="0"/>
+              <a:rPr lang="en-CA"/>
               <a:t>Click to edit Master text styles</a:t>
             </a:r>
           </a:p>
           <a:p>
             <a:pPr lvl="1"/>
             <a:r>
-              <a:rPr lang="en-CA" smtClean="0"/>
+              <a:rPr lang="en-CA"/>
               <a:t>Second level</a:t>
             </a:r>
           </a:p>
           <a:p>
             <a:pPr lvl="2"/>
             <a:r>
-              <a:rPr lang="en-CA" smtClean="0"/>
+              <a:rPr lang="en-CA"/>
               <a:t>Third level</a:t>
             </a:r>
           </a:p>
           <a:p>
             <a:pPr lvl="3"/>
             <a:r>
-              <a:rPr lang="en-CA" smtClean="0"/>
+              <a:rPr lang="en-CA"/>
               <a:t>Fourth level</a:t>
             </a:r>
           </a:p>
           <a:p>
             <a:pPr lvl="4"/>
             <a:r>
-              <a:rPr lang="en-CA" smtClean="0"/>
+              <a:rPr lang="en-CA"/>
               <a:t>Fifth level</a:t>
             </a:r>
             <a:endParaRPr lang="en-US"/>
@@ -2742,35 +2801,35 @@
           <a:p>
             <a:pPr lvl="0"/>
             <a:r>
-              <a:rPr lang="en-CA" smtClean="0"/>
+              <a:rPr lang="en-CA"/>
               <a:t>Click to edit Master text styles</a:t>
             </a:r>
           </a:p>
           <a:p>
             <a:pPr lvl="1"/>
             <a:r>
-              <a:rPr lang="en-CA" smtClean="0"/>
+              <a:rPr lang="en-CA"/>
               <a:t>Second level</a:t>
             </a:r>
           </a:p>
           <a:p>
             <a:pPr lvl="2"/>
             <a:r>
-              <a:rPr lang="en-CA" smtClean="0"/>
+              <a:rPr lang="en-CA"/>
               <a:t>Third level</a:t>
             </a:r>
           </a:p>
           <a:p>
             <a:pPr lvl="3"/>
             <a:r>
-              <a:rPr lang="en-CA" smtClean="0"/>
+              <a:rPr lang="en-CA"/>
               <a:t>Fourth level</a:t>
             </a:r>
           </a:p>
           <a:p>
             <a:pPr lvl="4"/>
             <a:r>
-              <a:rPr lang="en-CA" smtClean="0"/>
+              <a:rPr lang="en-CA"/>
               <a:t>Fifth level</a:t>
             </a:r>
             <a:endParaRPr lang="en-US"/>
@@ -2787,7 +2846,15 @@
             <p:ph type="dt" sz="half" idx="10"/>
           </p:nvPr>
         </p:nvSpPr>
-        <p:spPr/>
+        <p:spPr>
+          <a:xfrm>
+            <a:off x="685800" y="6248400"/>
+            <a:ext cx="1905000" cy="457200"/>
+          </a:xfrm>
+          <a:prstGeom prst="rect">
+            <a:avLst/>
+          </a:prstGeom>
+        </p:spPr>
         <p:txBody>
           <a:bodyPr/>
           <a:lstStyle>
@@ -2799,7 +2866,7 @@
             <a:fld id="{ABC23590-A601-0D4E-8E81-4963D950E64C}" type="datetime1">
               <a:rPr lang="en-US"/>
               <a:pPr/>
-              <a:t>16-06-14</a:t>
+              <a:t>5/29/19</a:t>
             </a:fld>
             <a:endParaRPr lang="en-US"/>
           </a:p>
@@ -2815,7 +2882,15 @@
             <p:ph type="ftr" sz="quarter" idx="11"/>
           </p:nvPr>
         </p:nvSpPr>
-        <p:spPr/>
+        <p:spPr>
+          <a:xfrm>
+            <a:off x="3124200" y="6248400"/>
+            <a:ext cx="2895600" cy="457200"/>
+          </a:xfrm>
+          <a:prstGeom prst="rect">
+            <a:avLst/>
+          </a:prstGeom>
+        </p:spPr>
         <p:txBody>
           <a:bodyPr/>
           <a:lstStyle>
@@ -2906,7 +2981,7 @@
           </a:lstStyle>
           <a:p>
             <a:r>
-              <a:rPr lang="en-CA" smtClean="0"/>
+              <a:rPr lang="en-CA"/>
               <a:t>Click to edit Master title style</a:t>
             </a:r>
             <a:endParaRPr lang="en-US"/>
@@ -2972,7 +3047,7 @@
           <a:p>
             <a:pPr lvl="0"/>
             <a:r>
-              <a:rPr lang="en-CA" smtClean="0"/>
+              <a:rPr lang="en-CA"/>
               <a:t>Click to edit Master text styles</a:t>
             </a:r>
           </a:p>
@@ -3028,35 +3103,35 @@
           <a:p>
             <a:pPr lvl="0"/>
             <a:r>
-              <a:rPr lang="en-CA" smtClean="0"/>
+              <a:rPr lang="en-CA"/>
               <a:t>Click to edit Master text styles</a:t>
             </a:r>
           </a:p>
           <a:p>
             <a:pPr lvl="1"/>
             <a:r>
-              <a:rPr lang="en-CA" smtClean="0"/>
+              <a:rPr lang="en-CA"/>
               <a:t>Second level</a:t>
             </a:r>
           </a:p>
           <a:p>
             <a:pPr lvl="2"/>
             <a:r>
-              <a:rPr lang="en-CA" smtClean="0"/>
+              <a:rPr lang="en-CA"/>
               <a:t>Third level</a:t>
             </a:r>
           </a:p>
           <a:p>
             <a:pPr lvl="3"/>
             <a:r>
-              <a:rPr lang="en-CA" smtClean="0"/>
+              <a:rPr lang="en-CA"/>
               <a:t>Fourth level</a:t>
             </a:r>
           </a:p>
           <a:p>
             <a:pPr lvl="4"/>
             <a:r>
-              <a:rPr lang="en-CA" smtClean="0"/>
+              <a:rPr lang="en-CA"/>
               <a:t>Fifth level</a:t>
             </a:r>
             <a:endParaRPr lang="en-US"/>
@@ -3122,7 +3197,7 @@
           <a:p>
             <a:pPr lvl="0"/>
             <a:r>
-              <a:rPr lang="en-CA" smtClean="0"/>
+              <a:rPr lang="en-CA"/>
               <a:t>Click to edit Master text styles</a:t>
             </a:r>
           </a:p>
@@ -3178,35 +3253,35 @@
           <a:p>
             <a:pPr lvl="0"/>
             <a:r>
-              <a:rPr lang="en-CA" smtClean="0"/>
+              <a:rPr lang="en-CA"/>
               <a:t>Click to edit Master text styles</a:t>
             </a:r>
           </a:p>
           <a:p>
             <a:pPr lvl="1"/>
             <a:r>
-              <a:rPr lang="en-CA" smtClean="0"/>
+              <a:rPr lang="en-CA"/>
               <a:t>Second level</a:t>
             </a:r>
           </a:p>
           <a:p>
             <a:pPr lvl="2"/>
             <a:r>
-              <a:rPr lang="en-CA" smtClean="0"/>
+              <a:rPr lang="en-CA"/>
               <a:t>Third level</a:t>
             </a:r>
           </a:p>
           <a:p>
             <a:pPr lvl="3"/>
             <a:r>
-              <a:rPr lang="en-CA" smtClean="0"/>
+              <a:rPr lang="en-CA"/>
               <a:t>Fourth level</a:t>
             </a:r>
           </a:p>
           <a:p>
             <a:pPr lvl="4"/>
             <a:r>
-              <a:rPr lang="en-CA" smtClean="0"/>
+              <a:rPr lang="en-CA"/>
               <a:t>Fifth level</a:t>
             </a:r>
             <a:endParaRPr lang="en-US"/>
@@ -3223,7 +3298,15 @@
             <p:ph type="dt" sz="half" idx="10"/>
           </p:nvPr>
         </p:nvSpPr>
-        <p:spPr/>
+        <p:spPr>
+          <a:xfrm>
+            <a:off x="685800" y="6248400"/>
+            <a:ext cx="1905000" cy="457200"/>
+          </a:xfrm>
+          <a:prstGeom prst="rect">
+            <a:avLst/>
+          </a:prstGeom>
+        </p:spPr>
         <p:txBody>
           <a:bodyPr/>
           <a:lstStyle>
@@ -3235,7 +3318,7 @@
             <a:fld id="{F80D6EEA-C880-B74F-9033-821B2613D0DA}" type="datetime1">
               <a:rPr lang="en-US"/>
               <a:pPr/>
-              <a:t>16-06-14</a:t>
+              <a:t>5/29/19</a:t>
             </a:fld>
             <a:endParaRPr lang="en-US"/>
           </a:p>
@@ -3251,7 +3334,15 @@
             <p:ph type="ftr" sz="quarter" idx="11"/>
           </p:nvPr>
         </p:nvSpPr>
-        <p:spPr/>
+        <p:spPr>
+          <a:xfrm>
+            <a:off x="3124200" y="6248400"/>
+            <a:ext cx="2895600" cy="457200"/>
+          </a:xfrm>
+          <a:prstGeom prst="rect">
+            <a:avLst/>
+          </a:prstGeom>
+        </p:spPr>
         <p:txBody>
           <a:bodyPr/>
           <a:lstStyle>
@@ -3333,7 +3424,7 @@
           <a:lstStyle/>
           <a:p>
             <a:r>
-              <a:rPr lang="en-CA" smtClean="0"/>
+              <a:rPr lang="en-CA"/>
               <a:t>Click to edit Master title style</a:t>
             </a:r>
             <a:endParaRPr lang="en-US"/>
@@ -3350,7 +3441,15 @@
             <p:ph type="dt" sz="half" idx="10"/>
           </p:nvPr>
         </p:nvSpPr>
-        <p:spPr/>
+        <p:spPr>
+          <a:xfrm>
+            <a:off x="685800" y="6248400"/>
+            <a:ext cx="1905000" cy="457200"/>
+          </a:xfrm>
+          <a:prstGeom prst="rect">
+            <a:avLst/>
+          </a:prstGeom>
+        </p:spPr>
         <p:txBody>
           <a:bodyPr/>
           <a:lstStyle>
@@ -3362,7 +3461,7 @@
             <a:fld id="{D67FB90A-5A86-AA47-9DF5-D4B51CBF5733}" type="datetime1">
               <a:rPr lang="en-US"/>
               <a:pPr/>
-              <a:t>16-06-14</a:t>
+              <a:t>5/29/19</a:t>
             </a:fld>
             <a:endParaRPr lang="en-US"/>
           </a:p>
@@ -3378,7 +3477,15 @@
             <p:ph type="ftr" sz="quarter" idx="11"/>
           </p:nvPr>
         </p:nvSpPr>
-        <p:spPr/>
+        <p:spPr>
+          <a:xfrm>
+            <a:off x="3124200" y="6248400"/>
+            <a:ext cx="2895600" cy="457200"/>
+          </a:xfrm>
+          <a:prstGeom prst="rect">
+            <a:avLst/>
+          </a:prstGeom>
+        </p:spPr>
         <p:txBody>
           <a:bodyPr/>
           <a:lstStyle>
@@ -3454,7 +3561,15 @@
             <p:ph type="dt" sz="half" idx="10"/>
           </p:nvPr>
         </p:nvSpPr>
-        <p:spPr/>
+        <p:spPr>
+          <a:xfrm>
+            <a:off x="685800" y="6248400"/>
+            <a:ext cx="1905000" cy="457200"/>
+          </a:xfrm>
+          <a:prstGeom prst="rect">
+            <a:avLst/>
+          </a:prstGeom>
+        </p:spPr>
         <p:txBody>
           <a:bodyPr/>
           <a:lstStyle>
@@ -3466,7 +3581,7 @@
             <a:fld id="{19D5CE67-D7FF-1A43-B8C8-8AC2D455325E}" type="datetime1">
               <a:rPr lang="en-US"/>
               <a:pPr/>
-              <a:t>16-06-14</a:t>
+              <a:t>5/29/19</a:t>
             </a:fld>
             <a:endParaRPr lang="en-US"/>
           </a:p>
@@ -3482,7 +3597,15 @@
             <p:ph type="ftr" sz="quarter" idx="11"/>
           </p:nvPr>
         </p:nvSpPr>
-        <p:spPr/>
+        <p:spPr>
+          <a:xfrm>
+            <a:off x="3124200" y="6248400"/>
+            <a:ext cx="2895600" cy="457200"/>
+          </a:xfrm>
+          <a:prstGeom prst="rect">
+            <a:avLst/>
+          </a:prstGeom>
+        </p:spPr>
         <p:txBody>
           <a:bodyPr/>
           <a:lstStyle>
@@ -3573,7 +3696,7 @@
           </a:lstStyle>
           <a:p>
             <a:r>
-              <a:rPr lang="en-CA" smtClean="0"/>
+              <a:rPr lang="en-CA"/>
               <a:t>Click to edit Master title style</a:t>
             </a:r>
             <a:endParaRPr lang="en-US"/>
@@ -3630,35 +3753,35 @@
           <a:p>
             <a:pPr lvl="0"/>
             <a:r>
-              <a:rPr lang="en-CA" smtClean="0"/>
+              <a:rPr lang="en-CA"/>
               <a:t>Click to edit Master text styles</a:t>
             </a:r>
           </a:p>
           <a:p>
             <a:pPr lvl="1"/>
             <a:r>
-              <a:rPr lang="en-CA" smtClean="0"/>
+              <a:rPr lang="en-CA"/>
               <a:t>Second level</a:t>
             </a:r>
           </a:p>
           <a:p>
             <a:pPr lvl="2"/>
             <a:r>
-              <a:rPr lang="en-CA" smtClean="0"/>
+              <a:rPr lang="en-CA"/>
               <a:t>Third level</a:t>
             </a:r>
           </a:p>
           <a:p>
             <a:pPr lvl="3"/>
             <a:r>
-              <a:rPr lang="en-CA" smtClean="0"/>
+              <a:rPr lang="en-CA"/>
               <a:t>Fourth level</a:t>
             </a:r>
           </a:p>
           <a:p>
             <a:pPr lvl="4"/>
             <a:r>
-              <a:rPr lang="en-CA" smtClean="0"/>
+              <a:rPr lang="en-CA"/>
               <a:t>Fifth level</a:t>
             </a:r>
             <a:endParaRPr lang="en-US"/>
@@ -3724,7 +3847,7 @@
           <a:p>
             <a:pPr lvl="0"/>
             <a:r>
-              <a:rPr lang="en-CA" smtClean="0"/>
+              <a:rPr lang="en-CA"/>
               <a:t>Click to edit Master text styles</a:t>
             </a:r>
           </a:p>
@@ -3740,7 +3863,15 @@
             <p:ph type="dt" sz="half" idx="10"/>
           </p:nvPr>
         </p:nvSpPr>
-        <p:spPr/>
+        <p:spPr>
+          <a:xfrm>
+            <a:off x="685800" y="6248400"/>
+            <a:ext cx="1905000" cy="457200"/>
+          </a:xfrm>
+          <a:prstGeom prst="rect">
+            <a:avLst/>
+          </a:prstGeom>
+        </p:spPr>
         <p:txBody>
           <a:bodyPr/>
           <a:lstStyle>
@@ -3752,7 +3883,7 @@
             <a:fld id="{8FB6C99C-CAE9-4A46-8B93-5F7F7EFB4D77}" type="datetime1">
               <a:rPr lang="en-US"/>
               <a:pPr/>
-              <a:t>16-06-14</a:t>
+              <a:t>5/29/19</a:t>
             </a:fld>
             <a:endParaRPr lang="en-US"/>
           </a:p>
@@ -3768,7 +3899,15 @@
             <p:ph type="ftr" sz="quarter" idx="11"/>
           </p:nvPr>
         </p:nvSpPr>
-        <p:spPr/>
+        <p:spPr>
+          <a:xfrm>
+            <a:off x="3124200" y="6248400"/>
+            <a:ext cx="2895600" cy="457200"/>
+          </a:xfrm>
+          <a:prstGeom prst="rect">
+            <a:avLst/>
+          </a:prstGeom>
+        </p:spPr>
         <p:txBody>
           <a:bodyPr/>
           <a:lstStyle>
@@ -3859,7 +3998,7 @@
           </a:lstStyle>
           <a:p>
             <a:r>
-              <a:rPr lang="en-CA" smtClean="0"/>
+              <a:rPr lang="en-CA"/>
               <a:t>Click to edit Master title style</a:t>
             </a:r>
             <a:endParaRPr lang="en-US"/>
@@ -3986,7 +4125,7 @@
           <a:p>
             <a:pPr lvl="0"/>
             <a:r>
-              <a:rPr lang="en-CA" smtClean="0"/>
+              <a:rPr lang="en-CA"/>
               <a:t>Click to edit Master text styles</a:t>
             </a:r>
           </a:p>
@@ -4002,7 +4141,15 @@
             <p:ph type="dt" sz="half" idx="10"/>
           </p:nvPr>
         </p:nvSpPr>
-        <p:spPr/>
+        <p:spPr>
+          <a:xfrm>
+            <a:off x="685800" y="6248400"/>
+            <a:ext cx="1905000" cy="457200"/>
+          </a:xfrm>
+          <a:prstGeom prst="rect">
+            <a:avLst/>
+          </a:prstGeom>
+        </p:spPr>
         <p:txBody>
           <a:bodyPr/>
           <a:lstStyle>
@@ -4014,7 +4161,7 @@
             <a:fld id="{E16CD525-494F-8149-9830-A66ADF4FE65A}" type="datetime1">
               <a:rPr lang="en-US"/>
               <a:pPr/>
-              <a:t>16-06-14</a:t>
+              <a:t>5/29/19</a:t>
             </a:fld>
             <a:endParaRPr lang="en-US"/>
           </a:p>
@@ -4030,7 +4177,15 @@
             <p:ph type="ftr" sz="quarter" idx="11"/>
           </p:nvPr>
         </p:nvSpPr>
-        <p:spPr/>
+        <p:spPr>
+          <a:xfrm>
+            <a:off x="3124200" y="6248400"/>
+            <a:ext cx="2895600" cy="457200"/>
+          </a:xfrm>
+          <a:prstGeom prst="rect">
+            <a:avLst/>
+          </a:prstGeom>
+        </p:spPr>
         <p:txBody>
           <a:bodyPr/>
           <a:lstStyle>
@@ -4220,100 +4375,6 @@
       </p:sp>
       <p:sp>
         <p:nvSpPr>
-          <p:cNvPr id="1028" name="Rectangle 4"/>
-          <p:cNvSpPr>
-            <a:spLocks noGrp="1" noChangeArrowheads="1"/>
-          </p:cNvSpPr>
-          <p:nvPr>
-            <p:ph type="dt" sz="half" idx="2"/>
-          </p:nvPr>
-        </p:nvSpPr>
-        <p:spPr bwMode="auto">
-          <a:xfrm>
-            <a:off x="685800" y="6248400"/>
-            <a:ext cx="1905000" cy="457200"/>
-          </a:xfrm>
-          <a:prstGeom prst="rect">
-            <a:avLst/>
-          </a:prstGeom>
-          <a:noFill/>
-          <a:ln w="9525">
-            <a:noFill/>
-            <a:miter lim="800000"/>
-            <a:headEnd/>
-            <a:tailEnd/>
-          </a:ln>
-          <a:effectLst/>
-        </p:spPr>
-        <p:txBody>
-          <a:bodyPr vert="horz" wrap="square" lIns="91440" tIns="45720" rIns="91440" bIns="45720" numCol="1" anchor="t" anchorCtr="0" compatLnSpc="1">
-            <a:prstTxWarp prst="textNoShape">
-              <a:avLst/>
-            </a:prstTxWarp>
-          </a:bodyPr>
-          <a:lstStyle>
-            <a:lvl1pPr>
-              <a:defRPr sz="1400">
-                <a:latin typeface="Candara"/>
-                <a:cs typeface="Candara"/>
-              </a:defRPr>
-            </a:lvl1pPr>
-          </a:lstStyle>
-          <a:p>
-            <a:fld id="{6780C54A-2D28-A949-AD94-8E7C2BB17BBF}" type="datetime1">
-              <a:rPr lang="en-US" smtClean="0"/>
-              <a:pPr/>
-              <a:t>16-06-14</a:t>
-            </a:fld>
-            <a:endParaRPr lang="en-US" dirty="0"/>
-          </a:p>
-        </p:txBody>
-      </p:sp>
-      <p:sp>
-        <p:nvSpPr>
-          <p:cNvPr id="1029" name="Rectangle 5"/>
-          <p:cNvSpPr>
-            <a:spLocks noGrp="1" noChangeArrowheads="1"/>
-          </p:cNvSpPr>
-          <p:nvPr>
-            <p:ph type="ftr" sz="quarter" idx="3"/>
-          </p:nvPr>
-        </p:nvSpPr>
-        <p:spPr bwMode="auto">
-          <a:xfrm>
-            <a:off x="3124200" y="6248400"/>
-            <a:ext cx="2895600" cy="457200"/>
-          </a:xfrm>
-          <a:prstGeom prst="rect">
-            <a:avLst/>
-          </a:prstGeom>
-          <a:noFill/>
-          <a:ln w="9525">
-            <a:noFill/>
-            <a:miter lim="800000"/>
-            <a:headEnd/>
-            <a:tailEnd/>
-          </a:ln>
-          <a:effectLst/>
-        </p:spPr>
-        <p:txBody>
-          <a:bodyPr vert="horz" wrap="square" lIns="91440" tIns="45720" rIns="91440" bIns="45720" numCol="1" anchor="t" anchorCtr="0" compatLnSpc="1">
-            <a:prstTxWarp prst="textNoShape">
-              <a:avLst/>
-            </a:prstTxWarp>
-          </a:bodyPr>
-          <a:lstStyle>
-            <a:lvl1pPr algn="ctr">
-              <a:defRPr sz="1400"/>
-            </a:lvl1pPr>
-          </a:lstStyle>
-          <a:p>
-            <a:endParaRPr lang="en-US" dirty="0"/>
-          </a:p>
-        </p:txBody>
-      </p:sp>
-      <p:sp>
-        <p:nvSpPr>
           <p:cNvPr id="1030" name="Rectangle 6"/>
           <p:cNvSpPr>
             <a:spLocks noGrp="1" noChangeArrowheads="1"/>
@@ -4360,6 +4421,49 @@
               <a:t>‹#›</a:t>
             </a:fld>
             <a:endParaRPr lang="en-US" dirty="0"/>
+          </a:p>
+        </p:txBody>
+      </p:sp>
+      <p:sp>
+        <p:nvSpPr>
+          <p:cNvPr id="2" name="Footer Placeholder 1">
+            <a:extLst>
+              <a:ext uri="{FF2B5EF4-FFF2-40B4-BE49-F238E27FC236}">
+                <a16:creationId xmlns:a16="http://schemas.microsoft.com/office/drawing/2014/main" id="{20CEA516-DB0A-A54B-8590-B485BCFD422E}"/>
+              </a:ext>
+            </a:extLst>
+          </p:cNvPr>
+          <p:cNvSpPr>
+            <a:spLocks noGrp="1"/>
+          </p:cNvSpPr>
+          <p:nvPr>
+            <p:ph type="ftr" sz="quarter" idx="3"/>
+          </p:nvPr>
+        </p:nvSpPr>
+        <p:spPr>
+          <a:xfrm>
+            <a:off x="3028950" y="6356350"/>
+            <a:ext cx="3086100" cy="365125"/>
+          </a:xfrm>
+          <a:prstGeom prst="rect">
+            <a:avLst/>
+          </a:prstGeom>
+        </p:spPr>
+        <p:txBody>
+          <a:bodyPr vert="horz" lIns="91440" tIns="45720" rIns="91440" bIns="45720" rtlCol="0" anchor="ctr"/>
+          <a:lstStyle>
+            <a:lvl1pPr algn="ctr">
+              <a:defRPr sz="1200">
+                <a:solidFill>
+                  <a:schemeClr val="tx1">
+                    <a:tint val="75000"/>
+                  </a:schemeClr>
+                </a:solidFill>
+              </a:defRPr>
+            </a:lvl1pPr>
+          </a:lstStyle>
+          <a:p>
+            <a:endParaRPr lang="en-US"/>
           </a:p>
         </p:txBody>
       </p:sp>
@@ -5031,30 +5135,6 @@
       </p:grpSpPr>
       <p:sp>
         <p:nvSpPr>
-          <p:cNvPr id="4" name="Date Placeholder 3"/>
-          <p:cNvSpPr>
-            <a:spLocks noGrp="1"/>
-          </p:cNvSpPr>
-          <p:nvPr>
-            <p:ph type="dt" sz="half" idx="10"/>
-          </p:nvPr>
-        </p:nvSpPr>
-        <p:spPr/>
-        <p:txBody>
-          <a:bodyPr/>
-          <a:lstStyle/>
-          <a:p>
-            <a:fld id="{A42E8446-64F2-7448-834B-909F20334693}" type="datetime1">
-              <a:rPr lang="en-US"/>
-              <a:pPr/>
-              <a:t>16-06-14</a:t>
-            </a:fld>
-            <a:endParaRPr lang="en-US"/>
-          </a:p>
-        </p:txBody>
-      </p:sp>
-      <p:sp>
-        <p:nvSpPr>
           <p:cNvPr id="5" name="Slide Number Placeholder 5"/>
           <p:cNvSpPr>
             <a:spLocks noGrp="1"/>
@@ -5221,13 +5301,6 @@
   <p:clrMapOvr>
     <a:masterClrMapping/>
   </p:clrMapOvr>
-  <p:timing>
-    <p:tnLst>
-      <p:par>
-        <p:cTn xmlns:p14="http://schemas.microsoft.com/office/powerpoint/2010/main" id="1" dur="indefinite" restart="never" nodeType="tmRoot"/>
-      </p:par>
-    </p:tnLst>
-  </p:timing>
 </p:sld>
 </file>
 
@@ -5250,30 +5323,6 @@
       </p:grpSpPr>
       <p:sp>
         <p:nvSpPr>
-          <p:cNvPr id="25" name="Date Placeholder 3"/>
-          <p:cNvSpPr>
-            <a:spLocks noGrp="1"/>
-          </p:cNvSpPr>
-          <p:nvPr>
-            <p:ph type="dt" sz="half" idx="10"/>
-          </p:nvPr>
-        </p:nvSpPr>
-        <p:spPr/>
-        <p:txBody>
-          <a:bodyPr/>
-          <a:lstStyle/>
-          <a:p>
-            <a:fld id="{47BAA21C-CFC8-D244-8DB8-282A2FE64CEF}" type="datetime1">
-              <a:rPr lang="en-US"/>
-              <a:pPr/>
-              <a:t>16-06-14</a:t>
-            </a:fld>
-            <a:endParaRPr lang="en-US"/>
-          </a:p>
-        </p:txBody>
-      </p:sp>
-      <p:sp>
-        <p:nvSpPr>
           <p:cNvPr id="26" name="Slide Number Placeholder 5"/>
           <p:cNvSpPr>
             <a:spLocks noGrp="1"/>
@@ -5312,16 +5361,8 @@
           <a:lstStyle/>
           <a:p>
             <a:r>
-              <a:rPr lang="en-US" dirty="0" smtClean="0"/>
-              <a:t>Derivation </a:t>
-            </a:r>
-            <a:r>
               <a:rPr lang="en-US" dirty="0"/>
-              <a:t>for</a:t>
-            </a:r>
-            <a:r>
-              <a:rPr lang="en-US" b="1" dirty="0"/>
-              <a:t/>
+              <a:t>Derivation for</a:t>
             </a:r>
             <a:br>
               <a:rPr lang="en-US" b="1" dirty="0"/>
@@ -6599,7 +6640,7 @@
               <a:buNone/>
             </a:pPr>
             <a:r>
-              <a:rPr lang="en-US" sz="2400" b="1" kern="0" dirty="0" smtClean="0">
+              <a:rPr lang="en-US" sz="2400" b="1" kern="0" dirty="0">
                 <a:solidFill>
                   <a:schemeClr val="accent2"/>
                 </a:solidFill>
@@ -6608,7 +6649,7 @@
               <a:t>Leaves nodes: </a:t>
             </a:r>
             <a:r>
-              <a:rPr lang="en-US" sz="2400" kern="0" dirty="0" smtClean="0">
+              <a:rPr lang="en-US" sz="2400" kern="0" dirty="0">
                 <a:solidFill>
                   <a:schemeClr val="accent2"/>
                 </a:solidFill>
@@ -6622,7 +6663,7 @@
               <a:buNone/>
             </a:pPr>
             <a:r>
-              <a:rPr lang="en-US" sz="2400" b="1" kern="0" dirty="0" smtClean="0">
+              <a:rPr lang="en-US" sz="2400" b="1" kern="0" dirty="0">
                 <a:solidFill>
                   <a:schemeClr val="accent2"/>
                 </a:solidFill>
@@ -6631,7 +6672,7 @@
               <a:t>Interior nodes:</a:t>
             </a:r>
             <a:r>
-              <a:rPr lang="en-US" sz="2400" kern="0" dirty="0" smtClean="0">
+              <a:rPr lang="en-US" sz="2400" kern="0" dirty="0">
                 <a:solidFill>
                   <a:schemeClr val="accent2"/>
                 </a:solidFill>
@@ -6645,7 +6686,7 @@
               <a:buNone/>
             </a:pPr>
             <a:r>
-              <a:rPr lang="en-US" sz="2400" kern="0" dirty="0" smtClean="0">
+              <a:rPr lang="en-US" sz="2400" kern="0" dirty="0">
                 <a:solidFill>
                   <a:schemeClr val="accent2"/>
                 </a:solidFill>
@@ -6653,12 +6694,6 @@
               </a:rPr>
               <a:t>non-terminals</a:t>
             </a:r>
-            <a:endParaRPr lang="en-US" sz="2400" kern="0" dirty="0">
-              <a:solidFill>
-                <a:schemeClr val="accent2"/>
-              </a:solidFill>
-              <a:sym typeface="Symbol" charset="2"/>
-            </a:endParaRPr>
           </a:p>
         </p:txBody>
       </p:sp>
@@ -6675,7 +6710,7 @@
   <p:timing>
     <p:tnLst>
       <p:par>
-        <p:cTn xmlns:p14="http://schemas.microsoft.com/office/powerpoint/2010/main" id="1" dur="indefinite" restart="never" nodeType="tmRoot">
+        <p:cTn id="1" dur="indefinite" restart="never" nodeType="tmRoot">
           <p:childTnLst>
             <p:seq concurrent="1" nextAc="seek">
               <p:cTn id="2" dur="indefinite" nodeType="mainSeq">
@@ -7147,30 +7182,6 @@
       </p:grpSpPr>
       <p:sp>
         <p:nvSpPr>
-          <p:cNvPr id="25" name="Date Placeholder 3"/>
-          <p:cNvSpPr>
-            <a:spLocks noGrp="1"/>
-          </p:cNvSpPr>
-          <p:nvPr>
-            <p:ph type="dt" sz="half" idx="10"/>
-          </p:nvPr>
-        </p:nvSpPr>
-        <p:spPr/>
-        <p:txBody>
-          <a:bodyPr/>
-          <a:lstStyle/>
-          <a:p>
-            <a:fld id="{7200853E-8451-1047-9681-7EA43BA43225}" type="datetime1">
-              <a:rPr lang="en-US"/>
-              <a:pPr/>
-              <a:t>16-06-14</a:t>
-            </a:fld>
-            <a:endParaRPr lang="en-US"/>
-          </a:p>
-        </p:txBody>
-      </p:sp>
-      <p:sp>
-        <p:nvSpPr>
           <p:cNvPr id="26" name="Slide Number Placeholder 5"/>
           <p:cNvSpPr>
             <a:spLocks noGrp="1"/>
@@ -7210,19 +7221,7 @@
           <a:p>
             <a:r>
               <a:rPr lang="en-US" dirty="0"/>
-              <a:t>Leftmost </a:t>
-            </a:r>
-            <a:r>
-              <a:rPr lang="en-US" dirty="0" smtClean="0"/>
-              <a:t>derivation </a:t>
-            </a:r>
-            <a:r>
-              <a:rPr lang="en-US" dirty="0"/>
-              <a:t>for</a:t>
-            </a:r>
-            <a:r>
-              <a:rPr lang="en-US" b="1" dirty="0"/>
-              <a:t/>
+              <a:t>Leftmost derivation for</a:t>
             </a:r>
             <a:br>
               <a:rPr lang="en-US" b="1" dirty="0"/>
@@ -8521,7 +8520,7 @@
               <a:buNone/>
             </a:pPr>
             <a:r>
-              <a:rPr lang="en-US" sz="2400" b="1" kern="0" dirty="0" smtClean="0">
+              <a:rPr lang="en-US" sz="2400" b="1" kern="0" dirty="0">
                 <a:solidFill>
                   <a:schemeClr val="accent2"/>
                 </a:solidFill>
@@ -8535,7 +8534,7 @@
               <a:buNone/>
             </a:pPr>
             <a:r>
-              <a:rPr lang="en-US" sz="2400" b="1" kern="0" dirty="0" smtClean="0">
+              <a:rPr lang="en-US" sz="2400" b="1" kern="0" dirty="0">
                 <a:solidFill>
                   <a:schemeClr val="accent2"/>
                 </a:solidFill>
@@ -8555,19 +8554,10 @@
                 </a:solidFill>
                 <a:sym typeface="Symbol" charset="2"/>
               </a:rPr>
-              <a:t> </a:t>
-            </a:r>
-            <a:r>
-              <a:rPr lang="en-US" sz="2400" b="1" kern="0" dirty="0" smtClean="0">
-                <a:solidFill>
-                  <a:schemeClr val="accent2"/>
-                </a:solidFill>
-                <a:sym typeface="Symbol" charset="2"/>
-              </a:rPr>
-              <a:t>           (</a:t>
-            </a:r>
-            <a:r>
-              <a:rPr lang="en-US" sz="2400" b="1" kern="0" dirty="0" err="1" smtClean="0">
+              <a:t>            (</a:t>
+            </a:r>
+            <a:r>
+              <a:rPr lang="en-US" sz="2400" b="1" kern="0" dirty="0" err="1">
                 <a:solidFill>
                   <a:schemeClr val="accent2"/>
                 </a:solidFill>
@@ -8576,7 +8566,7 @@
               <a:t>id+id</a:t>
             </a:r>
             <a:r>
-              <a:rPr lang="en-US" sz="2400" b="1" kern="0" dirty="0" smtClean="0">
+              <a:rPr lang="en-US" sz="2400" b="1" kern="0" dirty="0">
                 <a:solidFill>
                   <a:schemeClr val="accent2"/>
                 </a:solidFill>
@@ -8585,7 +8575,7 @@
               <a:t>)*id      </a:t>
             </a:r>
             <a:r>
-              <a:rPr lang="en-US" sz="2400" b="1" kern="0" dirty="0" err="1" smtClean="0">
+              <a:rPr lang="en-US" sz="2400" b="1" kern="0" dirty="0" err="1">
                 <a:solidFill>
                   <a:schemeClr val="accent2"/>
                 </a:solidFill>
@@ -8594,7 +8584,7 @@
               <a:t>vs</a:t>
             </a:r>
             <a:r>
-              <a:rPr lang="en-US" sz="2400" b="1" kern="0" dirty="0" smtClean="0">
+              <a:rPr lang="en-US" sz="2400" b="1" kern="0" dirty="0">
                 <a:solidFill>
                   <a:schemeClr val="accent2"/>
                 </a:solidFill>
@@ -8602,12 +8592,6 @@
               </a:rPr>
               <a:t>      id+(id*id)</a:t>
             </a:r>
-            <a:endParaRPr lang="en-US" sz="2400" b="1" kern="0" dirty="0">
-              <a:solidFill>
-                <a:schemeClr val="accent2"/>
-              </a:solidFill>
-              <a:sym typeface="Symbol" charset="2"/>
-            </a:endParaRPr>
           </a:p>
         </p:txBody>
       </p:sp>
@@ -8624,7 +8608,7 @@
   <p:timing>
     <p:tnLst>
       <p:par>
-        <p:cTn xmlns:p14="http://schemas.microsoft.com/office/powerpoint/2010/main" id="1" dur="indefinite" restart="never" nodeType="tmRoot">
+        <p:cTn id="1" dur="indefinite" restart="never" nodeType="tmRoot">
           <p:childTnLst>
             <p:seq concurrent="1" nextAc="seek">
               <p:cTn id="2" dur="indefinite" nodeType="mainSeq">
@@ -9096,30 +9080,6 @@
       </p:grpSpPr>
       <p:sp>
         <p:nvSpPr>
-          <p:cNvPr id="25" name="Date Placeholder 3"/>
-          <p:cNvSpPr>
-            <a:spLocks noGrp="1"/>
-          </p:cNvSpPr>
-          <p:nvPr>
-            <p:ph type="dt" sz="half" idx="10"/>
-          </p:nvPr>
-        </p:nvSpPr>
-        <p:spPr/>
-        <p:txBody>
-          <a:bodyPr/>
-          <a:lstStyle/>
-          <a:p>
-            <a:fld id="{716C9AD9-19EA-094E-9CA1-9034183DDBF4}" type="datetime1">
-              <a:rPr lang="en-US"/>
-              <a:pPr/>
-              <a:t>16-06-14</a:t>
-            </a:fld>
-            <a:endParaRPr lang="en-US"/>
-          </a:p>
-        </p:txBody>
-      </p:sp>
-      <p:sp>
-        <p:nvSpPr>
           <p:cNvPr id="26" name="Slide Number Placeholder 5"/>
           <p:cNvSpPr>
             <a:spLocks noGrp="1"/>
@@ -9160,10 +9120,6 @@
             <a:r>
               <a:rPr lang="en-US"/>
               <a:t>Rightmost derivation for</a:t>
-            </a:r>
-            <a:r>
-              <a:rPr lang="en-US" b="1"/>
-              <a:t/>
             </a:r>
             <a:br>
               <a:rPr lang="en-US" b="1"/>
@@ -10274,7 +10230,7 @@
   <p:timing>
     <p:tnLst>
       <p:par>
-        <p:cTn xmlns:p14="http://schemas.microsoft.com/office/powerpoint/2010/main" id="1" dur="indefinite" restart="never" nodeType="tmRoot">
+        <p:cTn id="1" dur="indefinite" restart="never" nodeType="tmRoot">
           <p:childTnLst>
             <p:seq concurrent="1" nextAc="seek">
               <p:cTn id="2" dur="indefinite" nodeType="mainSeq">
@@ -10630,10 +10586,9 @@
           <a:lstStyle/>
           <a:p>
             <a:r>
-              <a:rPr lang="en-CA" dirty="0" smtClean="0"/>
+              <a:rPr lang="en-CA" dirty="0"/>
               <a:t>Rightmost vs. Leftmost Derivation</a:t>
             </a:r>
-            <a:endParaRPr lang="en-CA" dirty="0"/>
           </a:p>
         </p:txBody>
       </p:sp>
@@ -10658,51 +10613,27 @@
           <a:lstStyle/>
           <a:p>
             <a:r>
-              <a:rPr lang="en-CA" dirty="0" smtClean="0"/>
+              <a:rPr lang="en-CA" dirty="0"/>
               <a:t>Note that rightmost and leftmost derivations have the same parse tree</a:t>
             </a:r>
           </a:p>
           <a:p>
             <a:pPr lvl="1"/>
             <a:r>
-              <a:rPr lang="en-CA" dirty="0" smtClean="0"/>
+              <a:rPr lang="en-CA" dirty="0"/>
               <a:t>Every parse tree has a rightmost and a leftmost derivation</a:t>
             </a:r>
           </a:p>
           <a:p>
             <a:pPr lvl="1"/>
             <a:r>
-              <a:rPr lang="en-CA" dirty="0" smtClean="0"/>
+              <a:rPr lang="en-CA" dirty="0"/>
               <a:t>Important in resolving ambiguity</a:t>
             </a:r>
           </a:p>
           <a:p>
             <a:pPr lvl="1"/>
             <a:endParaRPr lang="en-CA" dirty="0"/>
-          </a:p>
-        </p:txBody>
-      </p:sp>
-      <p:sp>
-        <p:nvSpPr>
-          <p:cNvPr id="4" name="Date Placeholder 3"/>
-          <p:cNvSpPr>
-            <a:spLocks noGrp="1"/>
-          </p:cNvSpPr>
-          <p:nvPr>
-            <p:ph type="dt" sz="half" idx="10"/>
-          </p:nvPr>
-        </p:nvSpPr>
-        <p:spPr/>
-        <p:txBody>
-          <a:bodyPr/>
-          <a:lstStyle/>
-          <a:p>
-            <a:fld id="{F668E4B5-49D5-B048-B5A5-3831D6A375F6}" type="datetime1">
-              <a:rPr lang="en-US" smtClean="0"/>
-              <a:pPr/>
-              <a:t>16-06-14</a:t>
-            </a:fld>
-            <a:endParaRPr lang="en-US"/>
           </a:p>
         </p:txBody>
       </p:sp>
@@ -10740,140 +10671,10 @@
   <p:clrMapOvr>
     <a:masterClrMapping/>
   </p:clrMapOvr>
-  <p:timing>
-    <p:tnLst>
-      <p:par>
-        <p:cTn xmlns:p14="http://schemas.microsoft.com/office/powerpoint/2010/main" id="1" dur="indefinite" restart="never" nodeType="tmRoot"/>
-      </p:par>
-    </p:tnLst>
-  </p:timing>
 </p:sld>
 </file>
 
 <file path=ppt/slides/slide15.xml><?xml version="1.0" encoding="utf-8"?>
-<p:sld xmlns:a="http://schemas.openxmlformats.org/drawingml/2006/main" xmlns:r="http://schemas.openxmlformats.org/officeDocument/2006/relationships" xmlns:p="http://schemas.openxmlformats.org/presentationml/2006/main">
-  <p:cSld>
-    <p:spTree>
-      <p:nvGrpSpPr>
-        <p:cNvPr id="1" name=""/>
-        <p:cNvGrpSpPr/>
-        <p:nvPr/>
-      </p:nvGrpSpPr>
-      <p:grpSpPr>
-        <a:xfrm>
-          <a:off x="0" y="0"/>
-          <a:ext cx="0" cy="0"/>
-          <a:chOff x="0" y="0"/>
-          <a:chExt cx="0" cy="0"/>
-        </a:xfrm>
-      </p:grpSpPr>
-      <p:sp>
-        <p:nvSpPr>
-          <p:cNvPr id="4" name="Date Placeholder 3"/>
-          <p:cNvSpPr>
-            <a:spLocks noGrp="1"/>
-          </p:cNvSpPr>
-          <p:nvPr>
-            <p:ph type="dt" sz="half" idx="10"/>
-          </p:nvPr>
-        </p:nvSpPr>
-        <p:spPr/>
-        <p:txBody>
-          <a:bodyPr/>
-          <a:lstStyle/>
-          <a:p>
-            <a:fld id="{F668E4B5-49D5-B048-B5A5-3831D6A375F6}" type="datetime1">
-              <a:rPr lang="en-US" smtClean="0"/>
-              <a:pPr/>
-              <a:t>16-06-14</a:t>
-            </a:fld>
-            <a:endParaRPr lang="en-US"/>
-          </a:p>
-        </p:txBody>
-      </p:sp>
-      <p:sp>
-        <p:nvSpPr>
-          <p:cNvPr id="5" name="Slide Number Placeholder 4"/>
-          <p:cNvSpPr>
-            <a:spLocks noGrp="1"/>
-          </p:cNvSpPr>
-          <p:nvPr>
-            <p:ph type="sldNum" sz="quarter" idx="12"/>
-          </p:nvPr>
-        </p:nvSpPr>
-        <p:spPr/>
-        <p:txBody>
-          <a:bodyPr/>
-          <a:lstStyle/>
-          <a:p>
-            <a:fld id="{D94201BD-6681-B946-ACD9-A8F6D28AC38D}" type="slidenum">
-              <a:rPr lang="en-US" smtClean="0"/>
-              <a:pPr/>
-              <a:t>15</a:t>
-            </a:fld>
-            <a:endParaRPr lang="en-US"/>
-          </a:p>
-        </p:txBody>
-      </p:sp>
-      <p:sp>
-        <p:nvSpPr>
-          <p:cNvPr id="6" name="TextBox 5"/>
-          <p:cNvSpPr txBox="1"/>
-          <p:nvPr/>
-        </p:nvSpPr>
-        <p:spPr>
-          <a:xfrm>
-            <a:off x="3203848" y="2780928"/>
-            <a:ext cx="2677836" cy="707886"/>
-          </a:xfrm>
-          <a:prstGeom prst="rect">
-            <a:avLst/>
-          </a:prstGeom>
-          <a:noFill/>
-        </p:spPr>
-        <p:txBody>
-          <a:bodyPr wrap="none" rtlCol="0">
-            <a:spAutoFit/>
-          </a:bodyPr>
-          <a:lstStyle/>
-          <a:p>
-            <a:r>
-              <a:rPr lang="en-US" sz="4000" dirty="0" smtClean="0">
-                <a:solidFill>
-                  <a:schemeClr val="accent2"/>
-                </a:solidFill>
-              </a:rPr>
-              <a:t>Extra Slides</a:t>
-            </a:r>
-            <a:endParaRPr lang="en-US" sz="4000" dirty="0">
-              <a:solidFill>
-                <a:schemeClr val="accent2"/>
-              </a:solidFill>
-            </a:endParaRPr>
-          </a:p>
-        </p:txBody>
-      </p:sp>
-    </p:spTree>
-    <p:extLst>
-      <p:ext uri="{BB962C8B-B14F-4D97-AF65-F5344CB8AC3E}">
-        <p14:creationId xmlns:p14="http://schemas.microsoft.com/office/powerpoint/2010/main" val="1781978119"/>
-      </p:ext>
-    </p:extLst>
-  </p:cSld>
-  <p:clrMapOvr>
-    <a:masterClrMapping/>
-  </p:clrMapOvr>
-  <p:timing>
-    <p:tnLst>
-      <p:par>
-        <p:cTn xmlns:p14="http://schemas.microsoft.com/office/powerpoint/2010/main" id="1" dur="indefinite" restart="never" nodeType="tmRoot"/>
-      </p:par>
-    </p:tnLst>
-  </p:timing>
-</p:sld>
-</file>
-
-<file path=ppt/slides/slide16.xml><?xml version="1.0" encoding="utf-8"?>
 <p:sld xmlns:a="http://schemas.openxmlformats.org/drawingml/2006/main" xmlns:r="http://schemas.openxmlformats.org/officeDocument/2006/relationships" xmlns:p="http://schemas.openxmlformats.org/presentationml/2006/main" showMasterPhAnim="0">
   <p:cSld>
     <p:spTree>
@@ -10892,30 +10693,6 @@
       </p:grpSpPr>
       <p:sp>
         <p:nvSpPr>
-          <p:cNvPr id="4" name="Date Placeholder 3"/>
-          <p:cNvSpPr>
-            <a:spLocks noGrp="1"/>
-          </p:cNvSpPr>
-          <p:nvPr>
-            <p:ph type="dt" sz="half" idx="10"/>
-          </p:nvPr>
-        </p:nvSpPr>
-        <p:spPr/>
-        <p:txBody>
-          <a:bodyPr/>
-          <a:lstStyle/>
-          <a:p>
-            <a:fld id="{15A16572-8914-3841-9763-309C94F2DB54}" type="datetime1">
-              <a:rPr lang="en-US"/>
-              <a:pPr/>
-              <a:t>16-06-14</a:t>
-            </a:fld>
-            <a:endParaRPr lang="en-US"/>
-          </a:p>
-        </p:txBody>
-      </p:sp>
-      <p:sp>
-        <p:nvSpPr>
           <p:cNvPr id="5" name="Slide Number Placeholder 5"/>
           <p:cNvSpPr>
             <a:spLocks noGrp="1"/>
@@ -10932,7 +10709,7 @@
             <a:fld id="{919C7423-FF06-534F-899C-C4A0E6D40CF8}" type="slidenum">
               <a:rPr lang="en-US"/>
               <a:pPr/>
-              <a:t>16</a:t>
+              <a:t>15</a:t>
             </a:fld>
             <a:endParaRPr lang="en-US"/>
           </a:p>
@@ -10981,7 +10758,7 @@
               </a:lnSpc>
             </a:pPr>
             <a:r>
-              <a:rPr lang="en-US" sz="2800"/>
+              <a:rPr lang="en-US" sz="2800" dirty="0"/>
               <a:t>First write (or read) a reference grammar of what you want to be valid programs</a:t>
             </a:r>
           </a:p>
@@ -10992,17 +10769,17 @@
               </a:lnSpc>
             </a:pPr>
             <a:r>
-              <a:rPr lang="en-US" sz="2800"/>
+              <a:rPr lang="en-US" sz="2800" dirty="0"/>
               <a:t>For now, we only worry about the structure, so the reference grammar might choose to over-generate in certain cases (e.g. </a:t>
             </a:r>
             <a:r>
-              <a:rPr lang="en-US" sz="2400">
+              <a:rPr lang="en-US" sz="2400" dirty="0">
                 <a:latin typeface="Courier" charset="0"/>
               </a:rPr>
               <a:t>bool x = 20;</a:t>
             </a:r>
             <a:r>
-              <a:rPr lang="en-US" sz="2800"/>
+              <a:rPr lang="en-US" sz="2800" dirty="0"/>
               <a:t> )</a:t>
             </a:r>
           </a:p>
@@ -11013,27 +10790,8 @@
               </a:lnSpc>
             </a:pPr>
             <a:r>
-              <a:rPr lang="en-US" sz="2800"/>
+              <a:rPr lang="en-US" sz="2800" dirty="0"/>
               <a:t>Convert the reference grammar to a CFG</a:t>
-            </a:r>
-          </a:p>
-          <a:p>
-            <a:pPr>
-              <a:lnSpc>
-                <a:spcPct val="90000"/>
-              </a:lnSpc>
-            </a:pPr>
-            <a:r>
-              <a:rPr lang="en-US" sz="2800"/>
-              <a:t>Certain CFGs might be easier to work with than others (this is the </a:t>
-            </a:r>
-            <a:r>
-              <a:rPr lang="en-US" sz="2800" b="1"/>
-              <a:t>essence</a:t>
-            </a:r>
-            <a:r>
-              <a:rPr lang="en-US" sz="2800"/>
-              <a:t> of the study of CFGs and their parsing algorithms for compilers)</a:t>
             </a:r>
           </a:p>
         </p:txBody>
@@ -11051,7 +10809,7 @@
   <p:timing>
     <p:tnLst>
       <p:par>
-        <p:cTn xmlns:p14="http://schemas.microsoft.com/office/powerpoint/2010/main" id="1" dur="indefinite" restart="never" nodeType="tmRoot">
+        <p:cTn id="1" dur="indefinite" restart="never" nodeType="tmRoot">
           <p:childTnLst>
             <p:seq concurrent="1" nextAc="seek">
               <p:cTn id="2" dur="indefinite" nodeType="mainSeq">
@@ -11203,55 +10961,6 @@
                       </p:childTnLst>
                     </p:cTn>
                   </p:par>
-                  <p:par>
-                    <p:cTn id="15" fill="hold">
-                      <p:stCondLst>
-                        <p:cond delay="indefinite"/>
-                      </p:stCondLst>
-                      <p:childTnLst>
-                        <p:par>
-                          <p:cTn id="16" fill="hold">
-                            <p:stCondLst>
-                              <p:cond delay="0"/>
-                            </p:stCondLst>
-                            <p:childTnLst>
-                              <p:par>
-                                <p:cTn id="17" presetID="1" presetClass="entr" presetSubtype="0" fill="hold" grpId="0" nodeType="clickEffect">
-                                  <p:stCondLst>
-                                    <p:cond delay="0"/>
-                                  </p:stCondLst>
-                                  <p:childTnLst>
-                                    <p:set>
-                                      <p:cBhvr>
-                                        <p:cTn id="18" dur="1" fill="hold">
-                                          <p:stCondLst>
-                                            <p:cond delay="499"/>
-                                          </p:stCondLst>
-                                        </p:cTn>
-                                        <p:tgtEl>
-                                          <p:spTgt spid="68611">
-                                            <p:txEl>
-                                              <p:pRg st="3" end="3"/>
-                                            </p:txEl>
-                                          </p:spTgt>
-                                        </p:tgtEl>
-                                        <p:attrNameLst>
-                                          <p:attrName>style.visibility</p:attrName>
-                                        </p:attrNameLst>
-                                      </p:cBhvr>
-                                      <p:to>
-                                        <p:strVal val="visible"/>
-                                      </p:to>
-                                    </p:set>
-                                  </p:childTnLst>
-                                </p:cTn>
-                              </p:par>
-                            </p:childTnLst>
-                          </p:cTn>
-                        </p:par>
-                      </p:childTnLst>
-                    </p:cTn>
-                  </p:par>
                 </p:childTnLst>
               </p:cTn>
               <p:prevCondLst>
@@ -11280,7 +10989,7 @@
 </p:sld>
 </file>
 
-<file path=ppt/slides/slide17.xml><?xml version="1.0" encoding="utf-8"?>
+<file path=ppt/slides/slide16.xml><?xml version="1.0" encoding="utf-8"?>
 <p:sld xmlns:a="http://schemas.openxmlformats.org/drawingml/2006/main" xmlns:r="http://schemas.openxmlformats.org/officeDocument/2006/relationships" xmlns:p="http://schemas.openxmlformats.org/presentationml/2006/main">
   <p:cSld>
     <p:spTree>
@@ -11299,30 +11008,6 @@
       </p:grpSpPr>
       <p:sp>
         <p:nvSpPr>
-          <p:cNvPr id="4" name="Date Placeholder 3"/>
-          <p:cNvSpPr>
-            <a:spLocks noGrp="1"/>
-          </p:cNvSpPr>
-          <p:nvPr>
-            <p:ph type="dt" sz="half" idx="10"/>
-          </p:nvPr>
-        </p:nvSpPr>
-        <p:spPr/>
-        <p:txBody>
-          <a:bodyPr/>
-          <a:lstStyle/>
-          <a:p>
-            <a:fld id="{A42E8446-64F2-7448-834B-909F20334693}" type="datetime1">
-              <a:rPr lang="en-US"/>
-              <a:pPr/>
-              <a:t>16-06-14</a:t>
-            </a:fld>
-            <a:endParaRPr lang="en-US"/>
-          </a:p>
-        </p:txBody>
-      </p:sp>
-      <p:sp>
-        <p:nvSpPr>
           <p:cNvPr id="5" name="Slide Number Placeholder 5"/>
           <p:cNvSpPr>
             <a:spLocks noGrp="1"/>
@@ -11339,7 +11024,7 @@
             <a:fld id="{63A95B6C-2605-6C4D-B8BD-DB2C569D7F0E}" type="slidenum">
               <a:rPr lang="en-US"/>
               <a:pPr/>
-              <a:t>17</a:t>
+              <a:t>16</a:t>
             </a:fld>
             <a:endParaRPr lang="en-US"/>
           </a:p>
@@ -11396,17 +11081,8 @@
               <a:rPr lang="en-US" dirty="0">
                 <a:sym typeface="Symbol" charset="2"/>
               </a:rPr>
-              <a:t>E + </a:t>
-            </a:r>
-            <a:r>
-              <a:rPr lang="en-US" dirty="0" smtClean="0">
-                <a:sym typeface="Symbol" charset="2"/>
-              </a:rPr>
-              <a:t>E { $$ = $1 + $3 }</a:t>
-            </a:r>
-            <a:endParaRPr lang="en-US" dirty="0">
-              <a:sym typeface="Symbol" charset="2"/>
-            </a:endParaRPr>
+              <a:t>E + E { $$ = $1 + $3 }</a:t>
+            </a:r>
           </a:p>
           <a:p>
             <a:r>
@@ -11425,29 +11101,8 @@
               <a:rPr lang="en-US" dirty="0">
                 <a:sym typeface="Symbol" charset="2"/>
               </a:rPr>
-              <a:t>E * E { $$ = $1 </a:t>
-            </a:r>
-            <a:r>
-              <a:rPr lang="en-US" dirty="0" smtClean="0">
-                <a:sym typeface="Symbol" charset="2"/>
-              </a:rPr>
-              <a:t>* </a:t>
-            </a:r>
-            <a:r>
-              <a:rPr lang="en-US" dirty="0">
-                <a:sym typeface="Symbol" charset="2"/>
-              </a:rPr>
-              <a:t>$3 </a:t>
-            </a:r>
-            <a:r>
-              <a:rPr lang="en-US" dirty="0" smtClean="0">
-                <a:sym typeface="Symbol" charset="2"/>
-              </a:rPr>
-              <a:t>}</a:t>
-            </a:r>
-            <a:endParaRPr lang="en-US" dirty="0">
-              <a:sym typeface="Symbol" charset="2"/>
-            </a:endParaRPr>
+              <a:t>E * E { $$ = $1 * $3 }</a:t>
+            </a:r>
           </a:p>
           <a:p>
             <a:r>
@@ -11466,17 +11121,8 @@
               <a:rPr lang="en-US" dirty="0">
                 <a:sym typeface="Symbol" charset="2"/>
               </a:rPr>
-              <a:t>( E ) { $$ = </a:t>
-            </a:r>
-            <a:r>
-              <a:rPr lang="en-US" dirty="0" smtClean="0">
-                <a:sym typeface="Symbol" charset="2"/>
-              </a:rPr>
-              <a:t>$2 }</a:t>
-            </a:r>
-            <a:endParaRPr lang="en-US" dirty="0">
-              <a:sym typeface="Symbol" charset="2"/>
-            </a:endParaRPr>
+              <a:t>( E ) { $$ = $2 }</a:t>
+            </a:r>
           </a:p>
           <a:p>
             <a:r>
@@ -11495,29 +11141,8 @@
               <a:rPr lang="en-US" dirty="0">
                 <a:sym typeface="Symbol" charset="2"/>
               </a:rPr>
-              <a:t>- E { $$ = </a:t>
-            </a:r>
-            <a:r>
-              <a:rPr lang="en-US" dirty="0" smtClean="0">
-                <a:sym typeface="Symbol" charset="2"/>
-              </a:rPr>
-              <a:t>-1 * $</a:t>
-            </a:r>
-            <a:r>
-              <a:rPr lang="en-US" dirty="0">
-                <a:sym typeface="Symbol" charset="2"/>
-              </a:rPr>
-              <a:t>2 </a:t>
-            </a:r>
-            <a:r>
-              <a:rPr lang="en-US" dirty="0" smtClean="0">
-                <a:sym typeface="Symbol" charset="2"/>
-              </a:rPr>
-              <a:t>}</a:t>
-            </a:r>
-            <a:endParaRPr lang="en-US" dirty="0">
-              <a:sym typeface="Symbol" charset="2"/>
-            </a:endParaRPr>
+              <a:t>- E { $$ = -1 * $2 }</a:t>
+            </a:r>
           </a:p>
           <a:p>
             <a:r>
@@ -11540,13 +11165,7 @@
               <a:rPr lang="en-US" dirty="0">
                 <a:sym typeface="Symbol" charset="2"/>
               </a:rPr>
-              <a:t>{ $$ = </a:t>
-            </a:r>
-            <a:r>
-              <a:rPr lang="en-US" dirty="0" smtClean="0">
-                <a:sym typeface="Symbol" charset="2"/>
-              </a:rPr>
-              <a:t>$1 }</a:t>
+              <a:t>{ $$ = $1 }</a:t>
             </a:r>
             <a:endParaRPr lang="en-US" dirty="0"/>
           </a:p>
@@ -11890,7 +11509,7 @@
             <a:lstStyle/>
             <a:p>
               <a:r>
-                <a:rPr lang="en-US" b="1" dirty="0" smtClean="0"/>
+                <a:rPr lang="en-US" b="1" dirty="0"/>
                 <a:t>id(5)</a:t>
               </a:r>
               <a:endParaRPr lang="en-US" dirty="0"/>
@@ -11932,7 +11551,7 @@
             <a:lstStyle/>
             <a:p>
               <a:r>
-                <a:rPr lang="en-US" b="1" dirty="0" smtClean="0"/>
+                <a:rPr lang="en-US" b="1" dirty="0"/>
                 <a:t>id(2)</a:t>
               </a:r>
               <a:endParaRPr lang="en-US" dirty="0"/>
@@ -11974,7 +11593,7 @@
             <a:lstStyle/>
             <a:p>
               <a:r>
-                <a:rPr lang="en-US" b="1" dirty="0" smtClean="0"/>
+                <a:rPr lang="en-US" b="1" dirty="0"/>
                 <a:t>id(3)</a:t>
               </a:r>
               <a:endParaRPr lang="en-US" dirty="0"/>
@@ -12275,10 +11894,9 @@
           <a:lstStyle/>
           <a:p>
             <a:r>
-              <a:rPr lang="en-US" dirty="0" smtClean="0"/>
+              <a:rPr lang="en-US" dirty="0"/>
               <a:t>2</a:t>
             </a:r>
-            <a:endParaRPr lang="en-US" dirty="0"/>
           </a:p>
         </p:txBody>
       </p:sp>
@@ -12305,10 +11923,9 @@
           <a:lstStyle/>
           <a:p>
             <a:r>
-              <a:rPr lang="en-US" dirty="0" smtClean="0"/>
+              <a:rPr lang="en-US" dirty="0"/>
               <a:t>3</a:t>
             </a:r>
-            <a:endParaRPr lang="en-US" dirty="0"/>
           </a:p>
         </p:txBody>
       </p:sp>
@@ -12335,10 +11952,9 @@
           <a:lstStyle/>
           <a:p>
             <a:r>
-              <a:rPr lang="en-US" dirty="0" smtClean="0"/>
+              <a:rPr lang="en-US" dirty="0"/>
               <a:t>5</a:t>
             </a:r>
-            <a:endParaRPr lang="en-US" dirty="0"/>
           </a:p>
         </p:txBody>
       </p:sp>
@@ -12365,10 +11981,9 @@
           <a:lstStyle/>
           <a:p>
             <a:r>
-              <a:rPr lang="en-US" dirty="0" smtClean="0"/>
+              <a:rPr lang="en-US" dirty="0"/>
               <a:t>5</a:t>
             </a:r>
-            <a:endParaRPr lang="en-US" dirty="0"/>
           </a:p>
         </p:txBody>
       </p:sp>
@@ -12395,10 +12010,9 @@
           <a:lstStyle/>
           <a:p>
             <a:r>
-              <a:rPr lang="en-US" dirty="0" smtClean="0"/>
+              <a:rPr lang="en-US" dirty="0"/>
               <a:t>25</a:t>
             </a:r>
-            <a:endParaRPr lang="en-US" dirty="0"/>
           </a:p>
         </p:txBody>
       </p:sp>
@@ -12415,7 +12029,7 @@
   <p:timing>
     <p:tnLst>
       <p:par>
-        <p:cTn xmlns:p14="http://schemas.microsoft.com/office/powerpoint/2010/main" id="1" dur="indefinite" restart="never" nodeType="tmRoot">
+        <p:cTn id="1" dur="indefinite" restart="never" nodeType="tmRoot">
           <p:childTnLst>
             <p:seq concurrent="1" nextAc="seek">
               <p:cTn id="2" dur="indefinite" nodeType="mainSeq">
@@ -12722,7 +12336,7 @@
 </p:sld>
 </file>
 
-<file path=ppt/slides/slide18.xml><?xml version="1.0" encoding="utf-8"?>
+<file path=ppt/slides/slide17.xml><?xml version="1.0" encoding="utf-8"?>
 <p:sld xmlns:a="http://schemas.openxmlformats.org/drawingml/2006/main" xmlns:r="http://schemas.openxmlformats.org/officeDocument/2006/relationships" xmlns:p="http://schemas.openxmlformats.org/presentationml/2006/main" showMasterPhAnim="0">
   <p:cSld>
     <p:spTree>
@@ -12741,30 +12355,6 @@
       </p:grpSpPr>
       <p:sp>
         <p:nvSpPr>
-          <p:cNvPr id="4" name="Date Placeholder 3"/>
-          <p:cNvSpPr>
-            <a:spLocks noGrp="1"/>
-          </p:cNvSpPr>
-          <p:nvPr>
-            <p:ph type="dt" sz="half" idx="10"/>
-          </p:nvPr>
-        </p:nvSpPr>
-        <p:spPr/>
-        <p:txBody>
-          <a:bodyPr/>
-          <a:lstStyle/>
-          <a:p>
-            <a:fld id="{0CA6A978-31C3-2143-9620-1EDAE19B8FA1}" type="datetime1">
-              <a:rPr lang="en-US"/>
-              <a:pPr/>
-              <a:t>16-06-14</a:t>
-            </a:fld>
-            <a:endParaRPr lang="en-US"/>
-          </a:p>
-        </p:txBody>
-      </p:sp>
-      <p:sp>
-        <p:nvSpPr>
           <p:cNvPr id="5" name="Slide Number Placeholder 5"/>
           <p:cNvSpPr>
             <a:spLocks noGrp="1"/>
@@ -12781,7 +12371,7 @@
             <a:fld id="{D9E9B752-E4C8-0445-8824-90025461059E}" type="slidenum">
               <a:rPr lang="en-US"/>
               <a:pPr/>
-              <a:t>18</a:t>
+              <a:t>17</a:t>
             </a:fld>
             <a:endParaRPr lang="en-US"/>
           </a:p>
@@ -12914,7 +12504,7 @@
   <p:timing>
     <p:tnLst>
       <p:par>
-        <p:cTn xmlns:p14="http://schemas.microsoft.com/office/powerpoint/2010/main" id="1" dur="indefinite" restart="never" nodeType="tmRoot">
+        <p:cTn id="1" dur="indefinite" restart="never" nodeType="tmRoot">
           <p:childTnLst>
             <p:seq concurrent="1" nextAc="seek">
               <p:cTn id="2" dur="indefinite" nodeType="mainSeq">
@@ -13186,30 +12776,6 @@
           <a:chExt cx="0" cy="0"/>
         </a:xfrm>
       </p:grpSpPr>
-      <p:sp>
-        <p:nvSpPr>
-          <p:cNvPr id="19" name="Date Placeholder 3"/>
-          <p:cNvSpPr>
-            <a:spLocks noGrp="1"/>
-          </p:cNvSpPr>
-          <p:nvPr>
-            <p:ph type="dt" sz="half" idx="10"/>
-          </p:nvPr>
-        </p:nvSpPr>
-        <p:spPr/>
-        <p:txBody>
-          <a:bodyPr/>
-          <a:lstStyle/>
-          <a:p>
-            <a:fld id="{741967F8-A4E8-8646-8771-B712DB0BA3AF}" type="datetime1">
-              <a:rPr lang="en-US"/>
-              <a:pPr/>
-              <a:t>16-06-14</a:t>
-            </a:fld>
-            <a:endParaRPr lang="en-US"/>
-          </a:p>
-        </p:txBody>
-      </p:sp>
       <p:sp>
         <p:nvSpPr>
           <p:cNvPr id="20" name="Slide Number Placeholder 5"/>
@@ -13960,18 +13526,13 @@
           <a:lstStyle/>
           <a:p>
             <a:r>
-              <a:rPr lang="en-CA" sz="1800" b="1" dirty="0" smtClean="0">
+              <a:rPr lang="en-CA" sz="1800" b="1" dirty="0">
                 <a:solidFill>
                   <a:srgbClr val="FF0000"/>
                 </a:solidFill>
               </a:rPr>
               <a:t>String of characters</a:t>
             </a:r>
-            <a:endParaRPr lang="en-CA" sz="1800" b="1" dirty="0">
-              <a:solidFill>
-                <a:srgbClr val="FF0000"/>
-              </a:solidFill>
-            </a:endParaRPr>
           </a:p>
         </p:txBody>
       </p:sp>
@@ -14003,18 +13564,10 @@
                   <a:srgbClr val="FF0000"/>
                 </a:solidFill>
               </a:rPr>
-              <a:t>f</a:t>
-            </a:r>
-            <a:r>
-              <a:rPr lang="en-CA" sz="1800" b="1" dirty="0" smtClean="0">
-                <a:solidFill>
-                  <a:srgbClr val="FF0000"/>
-                </a:solidFill>
-              </a:rPr>
-              <a:t>lex: </a:t>
-            </a:r>
-            <a:r>
-              <a:rPr lang="en-CA" sz="1800" b="1" dirty="0" err="1" smtClean="0">
+              <a:t>flex: </a:t>
+            </a:r>
+            <a:r>
+              <a:rPr lang="en-CA" sz="1800" b="1" dirty="0" err="1">
                 <a:solidFill>
                   <a:srgbClr val="FF0000"/>
                 </a:solidFill>
@@ -14022,18 +13575,13 @@
               <a:t>yylex</a:t>
             </a:r>
             <a:r>
-              <a:rPr lang="en-CA" sz="1800" b="1" dirty="0" smtClean="0">
+              <a:rPr lang="en-CA" sz="1800" b="1" dirty="0">
                 <a:solidFill>
                   <a:srgbClr val="FF0000"/>
                 </a:solidFill>
               </a:rPr>
               <a:t>()</a:t>
             </a:r>
-            <a:endParaRPr lang="en-CA" sz="1800" b="1" dirty="0">
-              <a:solidFill>
-                <a:srgbClr val="FF0000"/>
-              </a:solidFill>
-            </a:endParaRPr>
           </a:p>
         </p:txBody>
       </p:sp>
@@ -14042,13 +13590,6 @@
   <p:clrMapOvr>
     <a:masterClrMapping/>
   </p:clrMapOvr>
-  <p:timing>
-    <p:tnLst>
-      <p:par>
-        <p:cTn xmlns:p14="http://schemas.microsoft.com/office/powerpoint/2010/main" id="1" dur="indefinite" restart="never" nodeType="tmRoot"/>
-      </p:par>
-    </p:tnLst>
-  </p:timing>
 </p:sld>
 </file>
 
@@ -14085,10 +13626,9 @@
           <a:lstStyle/>
           <a:p>
             <a:r>
-              <a:rPr lang="en-CA" dirty="0" smtClean="0"/>
+              <a:rPr lang="en-CA" dirty="0"/>
               <a:t>Parsing</a:t>
             </a:r>
-            <a:endParaRPr lang="en-CA" dirty="0"/>
           </a:p>
         </p:txBody>
       </p:sp>
@@ -14113,67 +13653,35 @@
           <a:lstStyle/>
           <a:p>
             <a:r>
-              <a:rPr lang="en-CA" dirty="0" smtClean="0"/>
+              <a:rPr lang="en-CA" dirty="0"/>
               <a:t>Not all string of tokens are valid programs</a:t>
             </a:r>
           </a:p>
           <a:p>
             <a:r>
-              <a:rPr lang="en-CA" dirty="0" smtClean="0"/>
+              <a:rPr lang="en-CA" dirty="0"/>
               <a:t>Parser distinguishes between valid and invalid programs</a:t>
             </a:r>
           </a:p>
           <a:p>
             <a:r>
-              <a:rPr lang="en-CA" dirty="0" smtClean="0"/>
+              <a:rPr lang="en-CA" dirty="0"/>
               <a:t>We need </a:t>
             </a:r>
           </a:p>
           <a:p>
             <a:pPr lvl="1"/>
             <a:r>
-              <a:rPr lang="en-CA" dirty="0" smtClean="0"/>
+              <a:rPr lang="en-CA" dirty="0"/>
               <a:t>A language for describing valid string of tokens</a:t>
             </a:r>
           </a:p>
           <a:p>
             <a:pPr lvl="1"/>
             <a:r>
-              <a:rPr lang="en-CA" dirty="0" smtClean="0"/>
-              <a:t>A method for distinguishing valid from invalid</a:t>
-            </a:r>
-            <a:r>
               <a:rPr lang="en-CA" dirty="0"/>
-              <a:t> </a:t>
-            </a:r>
-            <a:r>
-              <a:rPr lang="en-CA" dirty="0" smtClean="0"/>
-              <a:t>programs</a:t>
-            </a:r>
-          </a:p>
-        </p:txBody>
-      </p:sp>
-      <p:sp>
-        <p:nvSpPr>
-          <p:cNvPr id="4" name="Date Placeholder 3"/>
-          <p:cNvSpPr>
-            <a:spLocks noGrp="1"/>
-          </p:cNvSpPr>
-          <p:nvPr>
-            <p:ph type="dt" sz="half" idx="10"/>
-          </p:nvPr>
-        </p:nvSpPr>
-        <p:spPr/>
-        <p:txBody>
-          <a:bodyPr/>
-          <a:lstStyle/>
-          <a:p>
-            <a:fld id="{F668E4B5-49D5-B048-B5A5-3831D6A375F6}" type="datetime1">
-              <a:rPr lang="en-US" smtClean="0"/>
-              <a:pPr/>
-              <a:t>16-06-14</a:t>
-            </a:fld>
-            <a:endParaRPr lang="en-US"/>
+              <a:t>A method for distinguishing valid from invalid programs</a:t>
+            </a:r>
           </a:p>
         </p:txBody>
       </p:sp>
@@ -14214,7 +13722,7 @@
   <p:timing>
     <p:tnLst>
       <p:par>
-        <p:cTn xmlns:p14="http://schemas.microsoft.com/office/powerpoint/2010/main" id="1" dur="indefinite" restart="never" nodeType="tmRoot">
+        <p:cTn id="1" dur="indefinite" restart="never" nodeType="tmRoot">
           <p:childTnLst>
             <p:seq concurrent="1" nextAc="seek">
               <p:cTn id="2" dur="indefinite" nodeType="mainSeq">
@@ -14388,10 +13896,9 @@
           <a:lstStyle/>
           <a:p>
             <a:r>
-              <a:rPr lang="en-CA" dirty="0" smtClean="0"/>
+              <a:rPr lang="en-CA" dirty="0"/>
               <a:t>Context-free Grammars (CFGs)</a:t>
             </a:r>
-            <a:endParaRPr lang="en-CA" dirty="0"/>
           </a:p>
         </p:txBody>
       </p:sp>
@@ -14411,13 +13918,13 @@
           <a:lstStyle/>
           <a:p>
             <a:r>
-              <a:rPr lang="en-CA" dirty="0" smtClean="0"/>
+              <a:rPr lang="en-CA" dirty="0"/>
               <a:t>Programming languages have recursive structure </a:t>
             </a:r>
           </a:p>
           <a:p>
             <a:r>
-              <a:rPr lang="en-CA" dirty="0" smtClean="0"/>
+              <a:rPr lang="en-CA" dirty="0"/>
               <a:t>An EXP is …</a:t>
             </a:r>
           </a:p>
@@ -14425,37 +13932,13 @@
             <a:endParaRPr lang="en-CA" dirty="0"/>
           </a:p>
           <a:p>
-            <a:endParaRPr lang="en-CA" dirty="0" smtClean="0"/>
-          </a:p>
-          <a:p>
-            <a:r>
-              <a:rPr lang="en-CA" dirty="0" smtClean="0"/>
+            <a:endParaRPr lang="en-CA" dirty="0"/>
+          </a:p>
+          <a:p>
+            <a:r>
+              <a:rPr lang="en-CA" dirty="0"/>
               <a:t>Context Free Grammars are natural notation for the recursive structures</a:t>
             </a:r>
-          </a:p>
-        </p:txBody>
-      </p:sp>
-      <p:sp>
-        <p:nvSpPr>
-          <p:cNvPr id="4" name="Date Placeholder 3"/>
-          <p:cNvSpPr>
-            <a:spLocks noGrp="1"/>
-          </p:cNvSpPr>
-          <p:nvPr>
-            <p:ph type="dt" sz="half" idx="10"/>
-          </p:nvPr>
-        </p:nvSpPr>
-        <p:spPr/>
-        <p:txBody>
-          <a:bodyPr/>
-          <a:lstStyle/>
-          <a:p>
-            <a:fld id="{F668E4B5-49D5-B048-B5A5-3831D6A375F6}" type="datetime1">
-              <a:rPr lang="en-US" smtClean="0"/>
-              <a:pPr/>
-              <a:t>16-06-14</a:t>
-            </a:fld>
-            <a:endParaRPr lang="en-US"/>
           </a:p>
         </p:txBody>
       </p:sp>
@@ -14529,34 +14012,24 @@
               <a:rPr lang="en-CA" dirty="0"/>
               <a:t> </a:t>
             </a:r>
-            <a:endParaRPr lang="en-CA" dirty="0" smtClean="0"/>
           </a:p>
           <a:p>
             <a:pPr lvl="1"/>
             <a:r>
               <a:rPr lang="en-CA" dirty="0"/>
-              <a:t>	</a:t>
-            </a:r>
-            <a:r>
-              <a:rPr lang="en-CA" dirty="0" smtClean="0"/>
-              <a:t>EXP </a:t>
+              <a:t>	EXP </a:t>
             </a:r>
           </a:p>
           <a:p>
             <a:pPr lvl="1"/>
             <a:r>
-              <a:rPr lang="en-CA" dirty="0" smtClean="0">
+              <a:rPr lang="en-CA" dirty="0">
                 <a:solidFill>
                   <a:schemeClr val="accent2"/>
                 </a:solidFill>
               </a:rPr>
               <a:t>end</a:t>
             </a:r>
-            <a:endParaRPr lang="en-CA" dirty="0">
-              <a:solidFill>
-                <a:schemeClr val="accent2"/>
-              </a:solidFill>
-            </a:endParaRPr>
           </a:p>
         </p:txBody>
       </p:sp>
@@ -14633,13 +14106,8 @@
             <a:pPr lvl="1"/>
             <a:r>
               <a:rPr lang="en-CA" dirty="0"/>
-              <a:t>	</a:t>
-            </a:r>
-            <a:r>
-              <a:rPr lang="en-CA" dirty="0" smtClean="0"/>
-              <a:t>EXP</a:t>
-            </a:r>
-            <a:endParaRPr lang="en-CA" dirty="0"/>
+              <a:t>	EXP</a:t>
+            </a:r>
           </a:p>
         </p:txBody>
       </p:sp>
@@ -14656,7 +14124,7 @@
   <p:timing>
     <p:tnLst>
       <p:par>
-        <p:cTn xmlns:p14="http://schemas.microsoft.com/office/powerpoint/2010/main" id="1" dur="indefinite" restart="never" nodeType="tmRoot">
+        <p:cTn id="1" dur="indefinite" restart="never" nodeType="tmRoot">
           <p:childTnLst>
             <p:seq concurrent="1" nextAc="seek">
               <p:cTn id="2" dur="indefinite" nodeType="mainSeq">
@@ -14792,34 +14260,34 @@
               <a:lstStyle/>
               <a:p>
                 <a:r>
-                  <a:rPr lang="en-CA" dirty="0" smtClean="0"/>
+                  <a:rPr lang="en-CA" dirty="0"/>
                   <a:t>A CFG consists of</a:t>
                 </a:r>
               </a:p>
               <a:p>
                 <a:pPr lvl="1"/>
                 <a:r>
-                  <a:rPr lang="en-CA" dirty="0" smtClean="0"/>
+                  <a:rPr lang="en-CA" dirty="0"/>
                   <a:t>A set of terminals  </a:t>
                 </a:r>
                 <a:r>
-                  <a:rPr lang="en-CA" dirty="0" smtClean="0">
+                  <a:rPr lang="en-CA" dirty="0">
                     <a:solidFill>
                       <a:schemeClr val="accent2"/>
                     </a:solidFill>
                   </a:rPr>
                   <a:t>T</a:t>
                 </a:r>
-                <a:endParaRPr lang="en-CA" dirty="0" smtClean="0"/>
+                <a:endParaRPr lang="en-CA" dirty="0"/>
               </a:p>
               <a:p>
                 <a:pPr lvl="1"/>
                 <a:r>
-                  <a:rPr lang="en-CA" dirty="0" smtClean="0"/>
+                  <a:rPr lang="en-CA" dirty="0"/>
                   <a:t>A set on non-terminals    </a:t>
                 </a:r>
                 <a:r>
-                  <a:rPr lang="en-CA" dirty="0" smtClean="0">
+                  <a:rPr lang="en-CA" dirty="0">
                     <a:solidFill>
                       <a:schemeClr val="accent2"/>
                     </a:solidFill>
@@ -14830,11 +14298,11 @@
               <a:p>
                 <a:pPr lvl="1"/>
                 <a:r>
-                  <a:rPr lang="en-CA" dirty="0" smtClean="0"/>
+                  <a:rPr lang="en-CA" dirty="0"/>
                   <a:t>A start symbol    </a:t>
                 </a:r>
                 <a:r>
-                  <a:rPr lang="en-CA" dirty="0" smtClean="0">
+                  <a:rPr lang="en-CA" dirty="0">
                     <a:solidFill>
                       <a:schemeClr val="accent2"/>
                     </a:solidFill>
@@ -14842,7 +14310,7 @@
                   <a:t>S</a:t>
                 </a:r>
                 <a14:m>
-                  <m:oMath xmlns:m="http://schemas.openxmlformats.org/officeDocument/2006/math" xmlns="">
+                  <m:oMath xmlns:m="http://schemas.openxmlformats.org/officeDocument/2006/math">
                     <m:r>
                       <a:rPr lang="en-CA" i="1" smtClean="0">
                         <a:solidFill>
@@ -14856,23 +14324,23 @@
                   </m:oMath>
                 </a14:m>
                 <a:r>
-                  <a:rPr lang="en-CA" dirty="0" smtClean="0">
+                  <a:rPr lang="en-CA" dirty="0">
                     <a:solidFill>
                       <a:schemeClr val="accent2"/>
                     </a:solidFill>
                   </a:rPr>
                   <a:t>N</a:t>
                 </a:r>
-                <a:endParaRPr lang="en-CA" dirty="0" smtClean="0"/>
+                <a:endParaRPr lang="en-CA" dirty="0"/>
               </a:p>
               <a:p>
                 <a:pPr lvl="1"/>
                 <a:r>
-                  <a:rPr lang="en-CA" dirty="0" smtClean="0"/>
+                  <a:rPr lang="en-CA" dirty="0"/>
                   <a:t>A set of  productions   </a:t>
                 </a:r>
                 <a:r>
-                  <a:rPr lang="en-CA" dirty="0" smtClean="0">
+                  <a:rPr lang="en-CA" dirty="0">
                     <a:solidFill>
                       <a:schemeClr val="accent2"/>
                     </a:solidFill>
@@ -14880,7 +14348,7 @@
                   <a:t> X</a:t>
                 </a:r>
                 <a14:m>
-                  <m:oMath xmlns:m="http://schemas.openxmlformats.org/officeDocument/2006/math" xmlns="">
+                  <m:oMath xmlns:m="http://schemas.openxmlformats.org/officeDocument/2006/math">
                     <m:r>
                       <a:rPr lang="en-CA" i="1" smtClean="0">
                         <a:solidFill>
@@ -14894,7 +14362,7 @@
                   </m:oMath>
                 </a14:m>
                 <a:r>
-                  <a:rPr lang="en-CA" dirty="0" smtClean="0">
+                  <a:rPr lang="en-CA" dirty="0">
                     <a:solidFill>
                       <a:schemeClr val="accent2"/>
                     </a:solidFill>
@@ -14902,7 +14370,7 @@
                   <a:t>Y</a:t>
                 </a:r>
                 <a:r>
-                  <a:rPr lang="en-CA" baseline="-25000" dirty="0" smtClean="0">
+                  <a:rPr lang="en-CA" baseline="-25000" dirty="0">
                     <a:solidFill>
                       <a:schemeClr val="accent2"/>
                     </a:solidFill>
@@ -14910,7 +14378,7 @@
                   <a:t>1</a:t>
                 </a:r>
                 <a:r>
-                  <a:rPr lang="en-CA" dirty="0" smtClean="0">
+                  <a:rPr lang="en-CA" dirty="0">
                     <a:solidFill>
                       <a:schemeClr val="accent2"/>
                     </a:solidFill>
@@ -14918,7 +14386,7 @@
                   <a:t>…</a:t>
                 </a:r>
                 <a:r>
-                  <a:rPr lang="en-CA" dirty="0" err="1" smtClean="0">
+                  <a:rPr lang="en-CA" dirty="0" err="1">
                     <a:solidFill>
                       <a:schemeClr val="accent2"/>
                     </a:solidFill>
@@ -14926,25 +14394,25 @@
                   <a:t>Y</a:t>
                 </a:r>
                 <a:r>
-                  <a:rPr lang="en-CA" baseline="-25000" dirty="0" err="1" smtClean="0">
+                  <a:rPr lang="en-CA" baseline="-25000" dirty="0" err="1">
                     <a:solidFill>
                       <a:schemeClr val="accent2"/>
                     </a:solidFill>
                   </a:rPr>
                   <a:t>n</a:t>
                 </a:r>
-                <a:endParaRPr lang="en-CA" baseline="-25000" dirty="0" smtClean="0"/>
+                <a:endParaRPr lang="en-CA" baseline="-25000" dirty="0"/>
               </a:p>
               <a:p>
                 <a:pPr marL="457200" lvl="1" indent="0">
                   <a:buNone/>
                 </a:pPr>
                 <a:r>
-                  <a:rPr lang="en-CA" baseline="-25000" dirty="0" smtClean="0"/>
+                  <a:rPr lang="en-CA" baseline="-25000" dirty="0"/>
                   <a:t>                                                                        </a:t>
                 </a:r>
                 <a:r>
-                  <a:rPr lang="en-CA" dirty="0" smtClean="0">
+                  <a:rPr lang="en-CA" dirty="0">
                     <a:solidFill>
                       <a:schemeClr val="accent2"/>
                     </a:solidFill>
@@ -14952,7 +14420,7 @@
                   <a:t>X</a:t>
                 </a:r>
                 <a14:m>
-                  <m:oMath xmlns:m="http://schemas.openxmlformats.org/officeDocument/2006/math" xmlns="">
+                  <m:oMath xmlns:m="http://schemas.openxmlformats.org/officeDocument/2006/math">
                     <m:r>
                       <a:rPr lang="en-CA" b="0" i="0" smtClean="0">
                         <a:solidFill>
@@ -14994,7 +14462,7 @@
                   <a:t>N</a:t>
                 </a:r>
                 <a:r>
-                  <a:rPr lang="en-CA" dirty="0" smtClean="0"/>
+                  <a:rPr lang="en-CA" dirty="0"/>
                   <a:t> </a:t>
                 </a:r>
               </a:p>
@@ -15004,14 +14472,10 @@
                 </a:pPr>
                 <a:r>
                   <a:rPr lang="en-CA" dirty="0"/>
-                  <a:t> </a:t>
+                  <a:t>                                               </a:t>
                 </a:r>
                 <a:r>
-                  <a:rPr lang="en-CA" dirty="0" smtClean="0"/>
-                  <a:t>                                              </a:t>
-                </a:r>
-                <a:r>
-                  <a:rPr lang="en-CA" dirty="0" smtClean="0">
+                  <a:rPr lang="en-CA" dirty="0">
                     <a:solidFill>
                       <a:schemeClr val="accent2"/>
                     </a:solidFill>
@@ -15019,7 +14483,7 @@
                   <a:t>Y</a:t>
                 </a:r>
                 <a:r>
-                  <a:rPr lang="en-CA" baseline="-25000" dirty="0" smtClean="0">
+                  <a:rPr lang="en-CA" baseline="-25000" dirty="0">
                     <a:solidFill>
                       <a:schemeClr val="accent2"/>
                     </a:solidFill>
@@ -15027,7 +14491,7 @@
                   <a:t>i</a:t>
                 </a:r>
                 <a:r>
-                  <a:rPr lang="en-CA" dirty="0" smtClean="0">
+                  <a:rPr lang="en-CA" dirty="0">
                     <a:solidFill>
                       <a:schemeClr val="accent2"/>
                     </a:solidFill>
@@ -15035,7 +14499,7 @@
                   <a:t> </a:t>
                 </a:r>
                 <a14:m>
-                  <m:oMath xmlns:m="http://schemas.openxmlformats.org/officeDocument/2006/math" xmlns="">
+                  <m:oMath xmlns:m="http://schemas.openxmlformats.org/officeDocument/2006/math">
                     <m:r>
                       <a:rPr lang="en-CA" i="1">
                         <a:solidFill>
@@ -15049,7 +14513,7 @@
                   </m:oMath>
                 </a14:m>
                 <a:r>
-                  <a:rPr lang="en-CA" dirty="0" smtClean="0">
+                  <a:rPr lang="en-CA" dirty="0">
                     <a:solidFill>
                       <a:schemeClr val="accent2"/>
                     </a:solidFill>
@@ -15057,11 +14521,11 @@
                   <a:t> N U T</a:t>
                 </a:r>
                 <a:r>
-                  <a:rPr lang="en-CA" dirty="0" smtClean="0"/>
+                  <a:rPr lang="en-CA" dirty="0"/>
                   <a:t> </a:t>
                 </a:r>
                 <a:r>
-                  <a:rPr lang="en-CA" dirty="0" smtClean="0">
+                  <a:rPr lang="en-CA" dirty="0">
                     <a:solidFill>
                       <a:schemeClr val="accent2"/>
                     </a:solidFill>
@@ -15069,7 +14533,7 @@
                   <a:t>U {</a:t>
                 </a:r>
                 <a:r>
-                  <a:rPr lang="el-GR" dirty="0" smtClean="0">
+                  <a:rPr lang="el-GR" dirty="0">
                     <a:solidFill>
                       <a:schemeClr val="accent2"/>
                     </a:solidFill>
@@ -15077,7 +14541,7 @@
                   <a:t>ε</a:t>
                 </a:r>
                 <a:r>
-                  <a:rPr lang="en-CA" dirty="0" smtClean="0">
+                  <a:rPr lang="en-CA" dirty="0">
                     <a:solidFill>
                       <a:schemeClr val="accent2"/>
                     </a:solidFill>
@@ -15125,30 +14589,6 @@
       </mc:AlternateContent>
       <p:sp>
         <p:nvSpPr>
-          <p:cNvPr id="4" name="Date Placeholder 3"/>
-          <p:cNvSpPr>
-            <a:spLocks noGrp="1"/>
-          </p:cNvSpPr>
-          <p:nvPr>
-            <p:ph type="dt" sz="half" idx="10"/>
-          </p:nvPr>
-        </p:nvSpPr>
-        <p:spPr/>
-        <p:txBody>
-          <a:bodyPr/>
-          <a:lstStyle/>
-          <a:p>
-            <a:fld id="{F668E4B5-49D5-B048-B5A5-3831D6A375F6}" type="datetime1">
-              <a:rPr lang="en-US" smtClean="0"/>
-              <a:pPr/>
-              <a:t>16-06-14</a:t>
-            </a:fld>
-            <a:endParaRPr lang="en-US"/>
-          </a:p>
-        </p:txBody>
-      </p:sp>
-      <p:sp>
-        <p:nvSpPr>
           <p:cNvPr id="5" name="Slide Number Placeholder 4"/>
           <p:cNvSpPr>
             <a:spLocks noGrp="1"/>
@@ -15184,7 +14624,7 @@
   <p:timing>
     <p:tnLst>
       <p:par>
-        <p:cTn xmlns:p14="http://schemas.microsoft.com/office/powerpoint/2010/main" id="1" dur="indefinite" restart="never" nodeType="tmRoot">
+        <p:cTn id="1" dur="indefinite" restart="never" nodeType="tmRoot">
           <p:childTnLst>
             <p:seq concurrent="1" nextAc="seek">
               <p:cTn id="2" dur="indefinite" nodeType="mainSeq">
@@ -15524,13 +14964,8 @@
           <a:p>
             <a:r>
               <a:rPr lang="en-CA" dirty="0"/>
-              <a:t>Context-free Grammars (CFGs</a:t>
-            </a:r>
-            <a:r>
-              <a:rPr lang="en-CA" dirty="0" smtClean="0"/>
-              <a:t>)</a:t>
-            </a:r>
-            <a:endParaRPr lang="en-CA" dirty="0"/>
+              <a:t>Context-free Grammars (CFGs)</a:t>
+            </a:r>
           </a:p>
         </p:txBody>
       </p:sp>
@@ -15552,16 +14987,16 @@
               <a:lstStyle/>
               <a:p>
                 <a:r>
-                  <a:rPr lang="en-CA" dirty="0" smtClean="0"/>
+                  <a:rPr lang="en-CA" dirty="0"/>
                   <a:t>{</a:t>
                 </a:r>
                 <a14:m>
-                  <m:oMath xmlns:m="http://schemas.openxmlformats.org/officeDocument/2006/math" xmlns="">
+                  <m:oMath xmlns:m="http://schemas.openxmlformats.org/officeDocument/2006/math">
                     <m:sSup>
                       <m:sSupPr>
                         <m:ctrlPr>
                           <a:rPr lang="en-CA" i="1" smtClean="0">
-                            <a:latin typeface="Cambria Math"/>
+                            <a:latin typeface="Cambria Math" panose="02040503050406030204" pitchFamily="18" charset="0"/>
                           </a:rPr>
                         </m:ctrlPr>
                       </m:sSupPr>
@@ -15586,7 +15021,7 @@
                       <m:sSupPr>
                         <m:ctrlPr>
                           <a:rPr lang="en-CA" i="1" smtClean="0">
-                            <a:latin typeface="Cambria Math"/>
+                            <a:latin typeface="Cambria Math" panose="02040503050406030204" pitchFamily="18" charset="0"/>
                           </a:rPr>
                         </m:ctrlPr>
                       </m:sSupPr>
@@ -15629,12 +15064,12 @@
                   </m:oMath>
                 </a14:m>
                 <a:r>
-                  <a:rPr lang="en-CA" dirty="0" smtClean="0"/>
+                  <a:rPr lang="en-CA" dirty="0"/>
                   <a:t> }</a:t>
                 </a:r>
               </a:p>
               <a:p>
-                <a:endParaRPr lang="en-CA" dirty="0" smtClean="0"/>
+                <a:endParaRPr lang="en-CA" dirty="0"/>
               </a:p>
               <a:p>
                 <a:endParaRPr lang="en-CA" dirty="0"/>
@@ -15645,14 +15080,10 @@
                 </a:pPr>
                 <a:r>
                   <a:rPr lang="en-CA" dirty="0"/>
-                  <a:t> </a:t>
+                  <a:t>        </a:t>
                 </a:r>
                 <a:r>
-                  <a:rPr lang="en-CA" dirty="0" smtClean="0"/>
-                  <a:t>       </a:t>
-                </a:r>
-                <a:r>
-                  <a:rPr lang="en-CA" dirty="0" smtClean="0">
+                  <a:rPr lang="en-CA" dirty="0">
                     <a:solidFill>
                       <a:schemeClr val="accent2"/>
                     </a:solidFill>
@@ -15669,7 +15100,7 @@
                   <a:t> </a:t>
                 </a:r>
                 <a14:m>
-                  <m:oMath xmlns:m="http://schemas.openxmlformats.org/officeDocument/2006/math" xmlns="">
+                  <m:oMath xmlns:m="http://schemas.openxmlformats.org/officeDocument/2006/math">
                     <m:r>
                       <a:rPr lang="en-CA" i="1">
                         <a:solidFill>
@@ -15683,7 +15114,7 @@
                   </m:oMath>
                 </a14:m>
                 <a:r>
-                  <a:rPr lang="en-CA" dirty="0" smtClean="0">
+                  <a:rPr lang="en-CA" dirty="0">
                     <a:solidFill>
                       <a:schemeClr val="accent2"/>
                     </a:solidFill>
@@ -15701,18 +15132,10 @@
                       <a:schemeClr val="accent2"/>
                     </a:solidFill>
                   </a:rPr>
-                  <a:t> </a:t>
-                </a:r>
-                <a:r>
-                  <a:rPr lang="en-CA" dirty="0" smtClean="0">
-                    <a:solidFill>
-                      <a:schemeClr val="accent2"/>
-                    </a:solidFill>
-                  </a:rPr>
-                  <a:t>       S </a:t>
+                  <a:t>        S </a:t>
                 </a:r>
                 <a14:m>
-                  <m:oMath xmlns:m="http://schemas.openxmlformats.org/officeDocument/2006/math" xmlns="">
+                  <m:oMath xmlns:m="http://schemas.openxmlformats.org/officeDocument/2006/math">
                     <m:r>
                       <a:rPr lang="en-CA" i="1">
                         <a:solidFill>
@@ -15726,7 +15149,7 @@
                   </m:oMath>
                 </a14:m>
                 <a:r>
-                  <a:rPr lang="en-CA" dirty="0" smtClean="0">
+                  <a:rPr lang="en-CA" dirty="0">
                     <a:solidFill>
                       <a:schemeClr val="accent2"/>
                     </a:solidFill>
@@ -15786,30 +15209,6 @@
       </mc:AlternateContent>
       <p:sp>
         <p:nvSpPr>
-          <p:cNvPr id="4" name="Date Placeholder 3"/>
-          <p:cNvSpPr>
-            <a:spLocks noGrp="1"/>
-          </p:cNvSpPr>
-          <p:nvPr>
-            <p:ph type="dt" sz="half" idx="10"/>
-          </p:nvPr>
-        </p:nvSpPr>
-        <p:spPr/>
-        <p:txBody>
-          <a:bodyPr/>
-          <a:lstStyle/>
-          <a:p>
-            <a:fld id="{F668E4B5-49D5-B048-B5A5-3831D6A375F6}" type="datetime1">
-              <a:rPr lang="en-US" smtClean="0"/>
-              <a:pPr/>
-              <a:t>16-06-14</a:t>
-            </a:fld>
-            <a:endParaRPr lang="en-US"/>
-          </a:p>
-        </p:txBody>
-      </p:sp>
-      <p:sp>
-        <p:nvSpPr>
           <p:cNvPr id="5" name="Slide Number Placeholder 4"/>
           <p:cNvSpPr>
             <a:spLocks noGrp="1"/>
@@ -15861,16 +15260,7 @@
                 </a:solidFill>
                 <a:latin typeface="Candara" panose="020E0502030303020204" pitchFamily="34" charset="0"/>
               </a:rPr>
-              <a:t>N </a:t>
-            </a:r>
-            <a:r>
-              <a:rPr lang="en-CA" sz="2800" dirty="0" smtClean="0">
-                <a:solidFill>
-                  <a:schemeClr val="accent2"/>
-                </a:solidFill>
-                <a:latin typeface="Candara" panose="020E0502030303020204" pitchFamily="34" charset="0"/>
-              </a:rPr>
-              <a:t>= {S}</a:t>
+              <a:t>N = {S}</a:t>
             </a:r>
             <a:endParaRPr lang="en-CA" sz="2800" dirty="0">
               <a:latin typeface="Candara" panose="020E0502030303020204" pitchFamily="34" charset="0"/>
@@ -15901,7 +15291,7 @@
           <a:p>
             <a:pPr lvl="1"/>
             <a:r>
-              <a:rPr lang="en-CA" sz="2800" dirty="0" smtClean="0">
+              <a:rPr lang="en-CA" sz="2800" dirty="0">
                 <a:solidFill>
                   <a:schemeClr val="accent2"/>
                 </a:solidFill>
@@ -15938,18 +15328,13 @@
           <a:lstStyle/>
           <a:p>
             <a:r>
-              <a:rPr lang="en-CA" dirty="0" smtClean="0">
+              <a:rPr lang="en-CA" dirty="0">
                 <a:solidFill>
                   <a:srgbClr val="FF0000"/>
                 </a:solidFill>
               </a:rPr>
               <a:t>Productions:</a:t>
             </a:r>
-            <a:endParaRPr lang="en-CA" dirty="0">
-              <a:solidFill>
-                <a:srgbClr val="FF0000"/>
-              </a:solidFill>
-            </a:endParaRPr>
           </a:p>
         </p:txBody>
       </p:sp>
@@ -15966,7 +15351,7 @@
   <p:timing>
     <p:tnLst>
       <p:par>
-        <p:cTn xmlns:p14="http://schemas.microsoft.com/office/powerpoint/2010/main" id="1" dur="indefinite" restart="never" nodeType="tmRoot">
+        <p:cTn id="1" dur="indefinite" restart="never" nodeType="tmRoot">
           <p:childTnLst>
             <p:seq concurrent="1" nextAc="seek">
               <p:cTn id="2" dur="indefinite" nodeType="mainSeq">
@@ -16218,11 +15603,11 @@
                   <a:buAutoNum type="arabicPeriod"/>
                 </a:pPr>
                 <a:r>
-                  <a:rPr lang="en-CA" dirty="0" smtClean="0"/>
+                  <a:rPr lang="en-CA" dirty="0"/>
                   <a:t>Begin with string that has only start symbol </a:t>
                 </a:r>
                 <a:r>
-                  <a:rPr lang="en-CA" dirty="0" smtClean="0">
+                  <a:rPr lang="en-CA" dirty="0">
                     <a:solidFill>
                       <a:schemeClr val="accent2"/>
                     </a:solidFill>
@@ -16236,11 +15621,11 @@
                   <a:buAutoNum type="arabicPeriod"/>
                 </a:pPr>
                 <a:r>
-                  <a:rPr lang="en-CA" dirty="0" smtClean="0"/>
+                  <a:rPr lang="en-CA" dirty="0"/>
                   <a:t>Replace any non-terminal </a:t>
                 </a:r>
                 <a:r>
-                  <a:rPr lang="en-CA" dirty="0" smtClean="0">
+                  <a:rPr lang="en-CA" dirty="0">
                     <a:solidFill>
                       <a:schemeClr val="accent2"/>
                     </a:solidFill>
@@ -16248,11 +15633,11 @@
                   <a:t>X</a:t>
                 </a:r>
                 <a:r>
-                  <a:rPr lang="en-CA" dirty="0" smtClean="0"/>
+                  <a:rPr lang="en-CA" dirty="0"/>
                   <a:t> in the string by the right-hand side of some production </a:t>
                 </a:r>
                 <a:r>
-                  <a:rPr lang="en-CA" dirty="0" smtClean="0">
+                  <a:rPr lang="en-CA" dirty="0">
                     <a:solidFill>
                       <a:schemeClr val="accent2"/>
                     </a:solidFill>
@@ -16260,7 +15645,7 @@
                   <a:t>X</a:t>
                 </a:r>
                 <a:r>
-                  <a:rPr lang="en-CA" dirty="0" smtClean="0">
+                  <a:rPr lang="en-CA" dirty="0">
                     <a:solidFill>
                       <a:schemeClr val="accent2"/>
                     </a:solidFill>
@@ -16269,7 +15654,7 @@
                   <a:t> </a:t>
                 </a:r>
                 <a14:m>
-                  <m:oMath xmlns:m="http://schemas.openxmlformats.org/officeDocument/2006/math" xmlns="">
+                  <m:oMath xmlns:m="http://schemas.openxmlformats.org/officeDocument/2006/math">
                     <m:r>
                       <a:rPr lang="en-CA" i="1">
                         <a:solidFill>
@@ -16288,18 +15673,10 @@
                       <a:schemeClr val="accent2"/>
                     </a:solidFill>
                   </a:rPr>
-                  <a:t> </a:t>
+                  <a:t> Y</a:t>
                 </a:r>
                 <a:r>
-                  <a:rPr lang="en-CA" dirty="0" smtClean="0">
-                    <a:solidFill>
-                      <a:schemeClr val="accent2"/>
-                    </a:solidFill>
-                  </a:rPr>
-                  <a:t>Y</a:t>
-                </a:r>
-                <a:r>
-                  <a:rPr lang="en-CA" baseline="-25000" dirty="0" smtClean="0">
+                  <a:rPr lang="en-CA" baseline="-25000" dirty="0">
                     <a:solidFill>
                       <a:schemeClr val="accent2"/>
                     </a:solidFill>
@@ -16307,7 +15684,7 @@
                   <a:t>1</a:t>
                 </a:r>
                 <a:r>
-                  <a:rPr lang="en-CA" dirty="0" smtClean="0">
+                  <a:rPr lang="en-CA" dirty="0">
                     <a:solidFill>
                       <a:schemeClr val="accent2"/>
                     </a:solidFill>
@@ -16315,18 +15692,13 @@
                   <a:t>…Y</a:t>
                 </a:r>
                 <a:r>
-                  <a:rPr lang="en-CA" baseline="-25000" dirty="0" smtClean="0">
+                  <a:rPr lang="en-CA" baseline="-25000" dirty="0">
                     <a:solidFill>
                       <a:schemeClr val="accent2"/>
                     </a:solidFill>
                   </a:rPr>
                   <a:t>n</a:t>
                 </a:r>
-                <a:endParaRPr lang="en-CA" baseline="-25000" dirty="0">
-                  <a:solidFill>
-                    <a:schemeClr val="accent2"/>
-                  </a:solidFill>
-                </a:endParaRPr>
               </a:p>
               <a:p>
                 <a:pPr marL="514350" indent="-514350">
@@ -16334,7 +15706,7 @@
                   <a:buAutoNum type="arabicPeriod"/>
                 </a:pPr>
                 <a:r>
-                  <a:rPr lang="en-CA" dirty="0" smtClean="0"/>
+                  <a:rPr lang="en-CA" dirty="0"/>
                   <a:t>Repeat (2) until there is no non-terminals</a:t>
                 </a:r>
               </a:p>
@@ -16381,30 +15753,6 @@
       </mc:AlternateContent>
       <p:sp>
         <p:nvSpPr>
-          <p:cNvPr id="4" name="Date Placeholder 3"/>
-          <p:cNvSpPr>
-            <a:spLocks noGrp="1"/>
-          </p:cNvSpPr>
-          <p:nvPr>
-            <p:ph type="dt" sz="half" idx="10"/>
-          </p:nvPr>
-        </p:nvSpPr>
-        <p:spPr/>
-        <p:txBody>
-          <a:bodyPr/>
-          <a:lstStyle/>
-          <a:p>
-            <a:fld id="{F668E4B5-49D5-B048-B5A5-3831D6A375F6}" type="datetime1">
-              <a:rPr lang="en-US" smtClean="0"/>
-              <a:pPr/>
-              <a:t>16-06-14</a:t>
-            </a:fld>
-            <a:endParaRPr lang="en-US"/>
-          </a:p>
-        </p:txBody>
-      </p:sp>
-      <p:sp>
-        <p:nvSpPr>
           <p:cNvPr id="5" name="Slide Number Placeholder 4"/>
           <p:cNvSpPr>
             <a:spLocks noGrp="1"/>
@@ -16471,7 +15819,7 @@
                   <a:t> </a:t>
                 </a:r>
                 <a14:m>
-                  <m:oMath xmlns:m="http://schemas.openxmlformats.org/officeDocument/2006/math" xmlns="">
+                  <m:oMath xmlns:m="http://schemas.openxmlformats.org/officeDocument/2006/math">
                     <m:r>
                       <a:rPr lang="en-CA" i="1">
                         <a:solidFill>
@@ -16498,7 +15846,7 @@
                   <a:buNone/>
                 </a:pPr>
                 <a:r>
-                  <a:rPr lang="en-CA" dirty="0" smtClean="0">
+                  <a:rPr lang="en-CA" dirty="0">
                     <a:solidFill>
                       <a:schemeClr val="accent2"/>
                     </a:solidFill>
@@ -16506,7 +15854,7 @@
                   <a:t>S </a:t>
                 </a:r>
                 <a14:m>
-                  <m:oMath xmlns:m="http://schemas.openxmlformats.org/officeDocument/2006/math" xmlns="">
+                  <m:oMath xmlns:m="http://schemas.openxmlformats.org/officeDocument/2006/math">
                     <m:r>
                       <a:rPr lang="en-CA" i="1">
                         <a:solidFill>
@@ -16608,18 +15956,13 @@
               <a:buNone/>
             </a:pPr>
             <a:r>
-              <a:rPr lang="en-CA" dirty="0" smtClean="0">
+              <a:rPr lang="en-CA" dirty="0">
                 <a:solidFill>
                   <a:schemeClr val="accent2"/>
                 </a:solidFill>
               </a:rPr>
               <a:t>S</a:t>
             </a:r>
-            <a:endParaRPr lang="en-CA" dirty="0">
-              <a:solidFill>
-                <a:schemeClr val="accent2"/>
-              </a:solidFill>
-            </a:endParaRPr>
           </a:p>
         </p:txBody>
       </p:sp>
@@ -16648,18 +15991,13 @@
               <a:buNone/>
             </a:pPr>
             <a:r>
-              <a:rPr lang="en-CA" dirty="0" smtClean="0">
+              <a:rPr lang="en-CA" dirty="0">
                 <a:solidFill>
                   <a:schemeClr val="accent2"/>
                 </a:solidFill>
               </a:rPr>
               <a:t>( S )</a:t>
             </a:r>
-            <a:endParaRPr lang="en-CA" dirty="0">
-              <a:solidFill>
-                <a:schemeClr val="accent2"/>
-              </a:solidFill>
-            </a:endParaRPr>
           </a:p>
         </p:txBody>
       </p:sp>
@@ -16688,18 +16026,13 @@
               <a:buNone/>
             </a:pPr>
             <a:r>
-              <a:rPr lang="en-CA" dirty="0" smtClean="0">
+              <a:rPr lang="en-CA" dirty="0">
                 <a:solidFill>
                   <a:schemeClr val="accent2"/>
                 </a:solidFill>
               </a:rPr>
               <a:t>( ( S ) )</a:t>
             </a:r>
-            <a:endParaRPr lang="en-CA" dirty="0">
-              <a:solidFill>
-                <a:schemeClr val="accent2"/>
-              </a:solidFill>
-            </a:endParaRPr>
           </a:p>
         </p:txBody>
       </p:sp>
@@ -16728,18 +16061,13 @@
               <a:buNone/>
             </a:pPr>
             <a:r>
-              <a:rPr lang="en-CA" dirty="0" smtClean="0">
+              <a:rPr lang="en-CA" dirty="0">
                 <a:solidFill>
                   <a:schemeClr val="accent2"/>
                 </a:solidFill>
               </a:rPr>
               <a:t>( (   ) )</a:t>
             </a:r>
-            <a:endParaRPr lang="en-CA" dirty="0">
-              <a:solidFill>
-                <a:schemeClr val="accent2"/>
-              </a:solidFill>
-            </a:endParaRPr>
           </a:p>
         </p:txBody>
       </p:sp>
@@ -16756,7 +16084,7 @@
   <p:timing>
     <p:tnLst>
       <p:par>
-        <p:cTn xmlns:p14="http://schemas.microsoft.com/office/powerpoint/2010/main" id="1" dur="indefinite" restart="never" nodeType="tmRoot">
+        <p:cTn id="1" dur="indefinite" restart="never" nodeType="tmRoot">
           <p:childTnLst>
             <p:seq concurrent="1" nextAc="seek">
               <p:cTn id="2" dur="indefinite" nodeType="mainSeq">
@@ -17005,10 +16333,9 @@
           <a:lstStyle/>
           <a:p>
             <a:r>
-              <a:rPr lang="en-CA" dirty="0" smtClean="0"/>
+              <a:rPr lang="en-CA" dirty="0"/>
               <a:t>Language of CFGs</a:t>
             </a:r>
-            <a:endParaRPr lang="en-CA" dirty="0"/>
           </a:p>
         </p:txBody>
       </p:sp>
@@ -17030,11 +16357,11 @@
               <a:lstStyle/>
               <a:p>
                 <a:r>
-                  <a:rPr lang="en-CA" dirty="0" smtClean="0"/>
+                  <a:rPr lang="en-CA" dirty="0"/>
                   <a:t>Let </a:t>
                 </a:r>
                 <a:r>
-                  <a:rPr lang="en-CA" dirty="0" smtClean="0">
+                  <a:rPr lang="en-CA" dirty="0">
                     <a:solidFill>
                       <a:schemeClr val="accent2"/>
                     </a:solidFill>
@@ -17042,11 +16369,11 @@
                   <a:t>G</a:t>
                 </a:r>
                 <a:r>
-                  <a:rPr lang="en-CA" dirty="0" smtClean="0"/>
+                  <a:rPr lang="en-CA" dirty="0"/>
                   <a:t> be a context free grammar with start symbol </a:t>
                 </a:r>
                 <a:r>
-                  <a:rPr lang="en-CA" dirty="0" smtClean="0">
+                  <a:rPr lang="en-CA" dirty="0">
                     <a:solidFill>
                       <a:schemeClr val="accent2"/>
                     </a:solidFill>
@@ -17054,11 +16381,11 @@
                   <a:t>S</a:t>
                 </a:r>
                 <a:r>
-                  <a:rPr lang="en-CA" dirty="0" smtClean="0"/>
+                  <a:rPr lang="en-CA" dirty="0"/>
                   <a:t>, and terminals </a:t>
                 </a:r>
                 <a:r>
-                  <a:rPr lang="en-CA" dirty="0" smtClean="0">
+                  <a:rPr lang="en-CA" dirty="0">
                     <a:solidFill>
                       <a:schemeClr val="accent2"/>
                     </a:solidFill>
@@ -17066,18 +16393,18 @@
                   <a:t>T</a:t>
                 </a:r>
                 <a:r>
-                  <a:rPr lang="en-CA" dirty="0" smtClean="0"/>
+                  <a:rPr lang="en-CA" dirty="0"/>
                   <a:t> </a:t>
                 </a:r>
               </a:p>
               <a:p>
                 <a:pPr lvl="1"/>
                 <a:r>
-                  <a:rPr lang="en-CA" dirty="0" smtClean="0"/>
+                  <a:rPr lang="en-CA" dirty="0"/>
                   <a:t>The language </a:t>
                 </a:r>
                 <a:r>
-                  <a:rPr lang="en-CA" dirty="0" smtClean="0">
+                  <a:rPr lang="en-CA" dirty="0">
                     <a:solidFill>
                       <a:schemeClr val="accent2"/>
                     </a:solidFill>
@@ -17085,11 +16412,11 @@
                   <a:t>L(G)</a:t>
                 </a:r>
                 <a:r>
-                  <a:rPr lang="en-CA" dirty="0" smtClean="0"/>
+                  <a:rPr lang="en-CA" dirty="0"/>
                   <a:t> of </a:t>
                 </a:r>
                 <a:r>
-                  <a:rPr lang="en-CA" dirty="0" smtClean="0">
+                  <a:rPr lang="en-CA" dirty="0">
                     <a:solidFill>
                       <a:schemeClr val="accent2"/>
                     </a:solidFill>
@@ -17097,20 +16424,20 @@
                   <a:t>G</a:t>
                 </a:r>
                 <a:r>
-                  <a:rPr lang="en-CA" dirty="0" smtClean="0"/>
+                  <a:rPr lang="en-CA" dirty="0"/>
                   <a:t> is:</a:t>
                 </a:r>
               </a:p>
               <a:p>
                 <a:pPr lvl="1"/>
-                <a:endParaRPr lang="en-CA" dirty="0" smtClean="0"/>
+                <a:endParaRPr lang="en-CA" dirty="0"/>
               </a:p>
               <a:p>
                 <a:pPr marL="914400" lvl="2" indent="0">
                   <a:buNone/>
                 </a:pPr>
                 <a14:m>
-                  <m:oMathPara xmlns:m="http://schemas.openxmlformats.org/officeDocument/2006/math" xmlns="">
+                  <m:oMathPara xmlns:m="http://schemas.openxmlformats.org/officeDocument/2006/math">
                     <m:oMathParaPr>
                       <m:jc m:val="centerGroup"/>
                     </m:oMathParaPr>
@@ -17124,7 +16451,7 @@
                               <a:solidFill>
                                 <a:schemeClr val="accent2"/>
                               </a:solidFill>
-                              <a:latin typeface="Cambria Math"/>
+                              <a:latin typeface="Cambria Math" panose="02040503050406030204" pitchFamily="18" charset="0"/>
                             </a:rPr>
                           </m:ctrlPr>
                         </m:dPr>
@@ -17136,7 +16463,7 @@
                                   <a:solidFill>
                                     <a:schemeClr val="accent2"/>
                                   </a:solidFill>
-                                  <a:latin typeface="Cambria Math"/>
+                                  <a:latin typeface="Cambria Math" panose="02040503050406030204" pitchFamily="18" charset="0"/>
                                   <a:ea typeface="Cambria Math"/>
                                 </a:rPr>
                               </m:ctrlPr>
@@ -17183,7 +16510,7 @@
                                   <a:solidFill>
                                     <a:schemeClr val="accent2"/>
                                   </a:solidFill>
-                                  <a:latin typeface="Cambria Math"/>
+                                  <a:latin typeface="Cambria Math" panose="02040503050406030204" pitchFamily="18" charset="0"/>
                                   <a:ea typeface="Cambria Math"/>
                                 </a:rPr>
                               </m:ctrlPr>
@@ -17231,7 +16558,7 @@
                               <a:solidFill>
                                 <a:schemeClr val="accent2"/>
                               </a:solidFill>
-                              <a:latin typeface="Cambria Math"/>
+                              <a:latin typeface="Cambria Math" panose="02040503050406030204" pitchFamily="18" charset="0"/>
                             </a:rPr>
                           </m:ctrlPr>
                         </m:sSubPr>
@@ -17275,7 +16602,7 @@
                               <a:solidFill>
                                 <a:schemeClr val="accent2"/>
                               </a:solidFill>
-                              <a:latin typeface="Cambria Math"/>
+                              <a:latin typeface="Cambria Math" panose="02040503050406030204" pitchFamily="18" charset="0"/>
                             </a:rPr>
                           </m:ctrlPr>
                         </m:sSubPr>
@@ -17350,7 +16677,7 @@
                               <a:solidFill>
                                 <a:schemeClr val="accent2"/>
                               </a:solidFill>
-                              <a:latin typeface="Cambria Math"/>
+                              <a:latin typeface="Cambria Math" panose="02040503050406030204" pitchFamily="18" charset="0"/>
                               <a:ea typeface="Cambria Math"/>
                             </a:rPr>
                           </m:ctrlPr>
@@ -17397,7 +16724,7 @@
                               <a:solidFill>
                                 <a:schemeClr val="accent2"/>
                               </a:solidFill>
-                              <a:latin typeface="Cambria Math"/>
+                              <a:latin typeface="Cambria Math" panose="02040503050406030204" pitchFamily="18" charset="0"/>
                               <a:ea typeface="Cambria Math"/>
                             </a:rPr>
                           </m:ctrlPr>
@@ -17444,7 +16771,7 @@
                               <a:solidFill>
                                 <a:schemeClr val="accent2"/>
                               </a:solidFill>
-                              <a:latin typeface="Cambria Math"/>
+                              <a:latin typeface="Cambria Math" panose="02040503050406030204" pitchFamily="18" charset="0"/>
                               <a:ea typeface="Cambria Math"/>
                             </a:rPr>
                           </m:ctrlPr>
@@ -17486,7 +16813,7 @@
                     </m:oMath>
                   </m:oMathPara>
                 </a14:m>
-                <a:endParaRPr lang="en-CA" sz="2800" dirty="0" smtClean="0">
+                <a:endParaRPr lang="en-CA" sz="2800" dirty="0">
                   <a:solidFill>
                     <a:schemeClr val="accent2"/>
                   </a:solidFill>
@@ -17497,7 +16824,7 @@
                   <a:buNone/>
                 </a:pPr>
                 <a:r>
-                  <a:rPr lang="en-CA" sz="2800" dirty="0" smtClean="0">
+                  <a:rPr lang="en-CA" sz="2800" dirty="0">
                     <a:solidFill>
                       <a:schemeClr val="accent2"/>
                     </a:solidFill>
@@ -17505,7 +16832,7 @@
                   <a:t>{</a:t>
                 </a:r>
                 <a:r>
-                  <a:rPr lang="el-GR" sz="2800" dirty="0" smtClean="0">
+                  <a:rPr lang="el-GR" sz="2800" dirty="0">
                     <a:solidFill>
                       <a:schemeClr val="accent2"/>
                     </a:solidFill>
@@ -17513,18 +16840,13 @@
                   <a:t>ε</a:t>
                 </a:r>
                 <a:r>
-                  <a:rPr lang="en-CA" sz="2800" dirty="0" smtClean="0">
+                  <a:rPr lang="en-CA" sz="2800" dirty="0">
                     <a:solidFill>
                       <a:schemeClr val="accent2"/>
                     </a:solidFill>
                   </a:rPr>
                   <a:t>, (), (()), ((())), …}</a:t>
                 </a:r>
-                <a:endParaRPr lang="en-CA" sz="2800" dirty="0">
-                  <a:solidFill>
-                    <a:schemeClr val="accent2"/>
-                  </a:solidFill>
-                </a:endParaRPr>
               </a:p>
             </p:txBody>
           </p:sp>
@@ -17565,30 +16887,6 @@
       </mc:AlternateContent>
       <p:sp>
         <p:nvSpPr>
-          <p:cNvPr id="4" name="Date Placeholder 3"/>
-          <p:cNvSpPr>
-            <a:spLocks noGrp="1"/>
-          </p:cNvSpPr>
-          <p:nvPr>
-            <p:ph type="dt" sz="half" idx="10"/>
-          </p:nvPr>
-        </p:nvSpPr>
-        <p:spPr/>
-        <p:txBody>
-          <a:bodyPr/>
-          <a:lstStyle/>
-          <a:p>
-            <a:fld id="{F668E4B5-49D5-B048-B5A5-3831D6A375F6}" type="datetime1">
-              <a:rPr lang="en-US" smtClean="0"/>
-              <a:pPr/>
-              <a:t>16-06-14</a:t>
-            </a:fld>
-            <a:endParaRPr lang="en-US"/>
-          </a:p>
-        </p:txBody>
-      </p:sp>
-      <p:sp>
-        <p:nvSpPr>
           <p:cNvPr id="5" name="Slide Number Placeholder 4"/>
           <p:cNvSpPr>
             <a:spLocks noGrp="1"/>
@@ -17624,7 +16922,7 @@
   <p:timing>
     <p:tnLst>
       <p:par>
-        <p:cTn xmlns:p14="http://schemas.microsoft.com/office/powerpoint/2010/main" id="1" dur="indefinite" restart="never" nodeType="tmRoot">
+        <p:cTn id="1" dur="indefinite" restart="never" nodeType="tmRoot">
           <p:childTnLst>
             <p:seq concurrent="1" nextAc="seek">
               <p:cTn id="2" dur="indefinite" nodeType="mainSeq">
@@ -17865,10 +17163,9 @@
           <a:lstStyle/>
           <a:p>
             <a:r>
-              <a:rPr lang="en-CA" dirty="0" smtClean="0"/>
+              <a:rPr lang="en-CA" dirty="0"/>
               <a:t>Derivation and Parse Tree</a:t>
             </a:r>
-            <a:endParaRPr lang="en-CA" dirty="0"/>
           </a:p>
         </p:txBody>
       </p:sp>
@@ -17895,7 +17192,7 @@
               <a:lstStyle/>
               <a:p>
                 <a:r>
-                  <a:rPr lang="en-CA" dirty="0" smtClean="0"/>
+                  <a:rPr lang="en-CA" dirty="0"/>
                   <a:t>A derivation is a sequence of productions</a:t>
                 </a:r>
               </a:p>
@@ -17904,7 +17201,7 @@
                   <a:buNone/>
                 </a:pPr>
                 <a14:m>
-                  <m:oMathPara xmlns:m="http://schemas.openxmlformats.org/officeDocument/2006/math" xmlns="">
+                  <m:oMathPara xmlns:m="http://schemas.openxmlformats.org/officeDocument/2006/math">
                     <m:oMathParaPr>
                       <m:jc m:val="centerGroup"/>
                     </m:oMathParaPr>
@@ -17952,7 +17249,7 @@
                     </m:oMath>
                   </m:oMathPara>
                 </a14:m>
-                <a:endParaRPr lang="en-CA" sz="2800" dirty="0" smtClean="0">
+                <a:endParaRPr lang="en-CA" sz="2800" dirty="0">
                   <a:solidFill>
                     <a:schemeClr val="accent2"/>
                   </a:solidFill>
@@ -17961,7 +17258,7 @@
               </a:p>
               <a:p>
                 <a:pPr marL="457200" lvl="2" indent="-457200"/>
-                <a:endParaRPr lang="en-CA" sz="3200" dirty="0" smtClean="0">
+                <a:endParaRPr lang="en-CA" sz="3200" dirty="0">
                   <a:solidFill>
                     <a:schemeClr val="accent2"/>
                   </a:solidFill>
@@ -17970,7 +17267,7 @@
               <a:p>
                 <a:pPr marL="457200" lvl="2" indent="-457200"/>
                 <a:r>
-                  <a:rPr lang="en-CA" sz="3200" dirty="0" smtClean="0">
+                  <a:rPr lang="en-CA" sz="3200" dirty="0">
                     <a:solidFill>
                       <a:schemeClr val="tx1"/>
                     </a:solidFill>
@@ -17978,7 +17275,7 @@
                   <a:t>A derivation can be drawn as a </a:t>
                 </a:r>
                 <a:r>
-                  <a:rPr lang="en-CA" sz="3200" dirty="0" smtClean="0">
+                  <a:rPr lang="en-CA" sz="3200" dirty="0">
                     <a:solidFill>
                       <a:schemeClr val="accent2"/>
                     </a:solidFill>
@@ -17986,7 +17283,7 @@
                   <a:t>parse tree</a:t>
                 </a:r>
                 <a:r>
-                  <a:rPr lang="en-CA" sz="3200" dirty="0" smtClean="0">
+                  <a:rPr lang="en-CA" sz="3200" dirty="0">
                     <a:solidFill>
                       <a:schemeClr val="tx1"/>
                     </a:solidFill>
@@ -17997,7 +17294,7 @@
               <a:p>
                 <a:pPr marL="914400" lvl="3" indent="-457200"/>
                 <a:r>
-                  <a:rPr lang="en-CA" sz="2800" dirty="0" smtClean="0">
+                  <a:rPr lang="en-CA" sz="2800" dirty="0">
                     <a:solidFill>
                       <a:schemeClr val="tx1"/>
                     </a:solidFill>
@@ -18008,7 +17305,7 @@
               <a:p>
                 <a:pPr marL="914400" lvl="3" indent="-457200"/>
                 <a:r>
-                  <a:rPr lang="en-CA" sz="2800" dirty="0" smtClean="0">
+                  <a:rPr lang="en-CA" sz="2800" dirty="0">
                     <a:solidFill>
                       <a:schemeClr val="tx1"/>
                     </a:solidFill>
@@ -18016,7 +17313,7 @@
                   <a:t>For a production </a:t>
                 </a:r>
                 <a:r>
-                  <a:rPr lang="en-CA" sz="2800" dirty="0" smtClean="0">
+                  <a:rPr lang="en-CA" sz="2800" dirty="0">
                     <a:solidFill>
                       <a:schemeClr val="accent2"/>
                     </a:solidFill>
@@ -18024,7 +17321,7 @@
                   <a:t>X</a:t>
                 </a:r>
                 <a14:m>
-                  <m:oMath xmlns:m="http://schemas.openxmlformats.org/officeDocument/2006/math" xmlns="">
+                  <m:oMath xmlns:m="http://schemas.openxmlformats.org/officeDocument/2006/math">
                     <m:r>
                       <a:rPr lang="en-CA" sz="2800" i="1">
                         <a:solidFill>
@@ -18038,7 +17335,7 @@
                   </m:oMath>
                 </a14:m>
                 <a:r>
-                  <a:rPr lang="en-CA" sz="2800" dirty="0" smtClean="0">
+                  <a:rPr lang="en-CA" sz="2800" dirty="0">
                     <a:solidFill>
                       <a:schemeClr val="accent2"/>
                     </a:solidFill>
@@ -18046,7 +17343,7 @@
                   <a:t>Y</a:t>
                 </a:r>
                 <a:r>
-                  <a:rPr lang="en-CA" sz="2800" baseline="-25000" dirty="0" smtClean="0">
+                  <a:rPr lang="en-CA" sz="2800" baseline="-25000" dirty="0">
                     <a:solidFill>
                       <a:schemeClr val="accent2"/>
                     </a:solidFill>
@@ -18054,7 +17351,7 @@
                   <a:t>1</a:t>
                 </a:r>
                 <a:r>
-                  <a:rPr lang="en-CA" sz="2800" dirty="0" smtClean="0">
+                  <a:rPr lang="en-CA" sz="2800" dirty="0">
                     <a:solidFill>
                       <a:schemeClr val="accent2"/>
                     </a:solidFill>
@@ -18062,7 +17359,7 @@
                   <a:t>…</a:t>
                 </a:r>
                 <a:r>
-                  <a:rPr lang="en-CA" sz="2800" dirty="0" err="1" smtClean="0">
+                  <a:rPr lang="en-CA" sz="2800" dirty="0" err="1">
                     <a:solidFill>
                       <a:schemeClr val="accent2"/>
                     </a:solidFill>
@@ -18070,7 +17367,7 @@
                   <a:t>Y</a:t>
                 </a:r>
                 <a:r>
-                  <a:rPr lang="en-CA" sz="2800" baseline="-25000" dirty="0" err="1" smtClean="0">
+                  <a:rPr lang="en-CA" sz="2800" baseline="-25000" dirty="0" err="1">
                     <a:solidFill>
                       <a:schemeClr val="accent2"/>
                     </a:solidFill>
@@ -18083,15 +17380,7 @@
                       <a:schemeClr val="tx1"/>
                     </a:solidFill>
                   </a:rPr>
-                  <a:t> </a:t>
-                </a:r>
-                <a:r>
-                  <a:rPr lang="en-CA" sz="2800" dirty="0" smtClean="0">
-                    <a:solidFill>
-                      <a:schemeClr val="tx1"/>
-                    </a:solidFill>
-                  </a:rPr>
-                  <a:t>add </a:t>
+                  <a:t> add </a:t>
                 </a:r>
               </a:p>
               <a:p>
@@ -18104,18 +17393,10 @@
                       <a:schemeClr val="tx1"/>
                     </a:solidFill>
                   </a:rPr>
-                  <a:t> </a:t>
+                  <a:t>       children </a:t>
                 </a:r>
                 <a:r>
-                  <a:rPr lang="en-CA" sz="2800" dirty="0" smtClean="0">
-                    <a:solidFill>
-                      <a:schemeClr val="tx1"/>
-                    </a:solidFill>
-                  </a:rPr>
-                  <a:t>      children </a:t>
-                </a:r>
-                <a:r>
-                  <a:rPr lang="en-CA" sz="2800" dirty="0" smtClean="0">
+                  <a:rPr lang="en-CA" sz="2800" dirty="0">
                     <a:solidFill>
                       <a:schemeClr val="accent2"/>
                     </a:solidFill>
@@ -18123,7 +17404,7 @@
                   <a:t>Y</a:t>
                 </a:r>
                 <a:r>
-                  <a:rPr lang="en-CA" sz="2800" baseline="-25000" dirty="0" smtClean="0">
+                  <a:rPr lang="en-CA" sz="2800" baseline="-25000" dirty="0">
                     <a:solidFill>
                       <a:schemeClr val="accent2"/>
                     </a:solidFill>
@@ -18131,7 +17412,7 @@
                   <a:t>1</a:t>
                 </a:r>
                 <a:r>
-                  <a:rPr lang="en-CA" sz="2800" dirty="0" smtClean="0">
+                  <a:rPr lang="en-CA" sz="2800" dirty="0">
                     <a:solidFill>
                       <a:schemeClr val="accent2"/>
                     </a:solidFill>
@@ -18139,7 +17420,7 @@
                   <a:t>…</a:t>
                 </a:r>
                 <a:r>
-                  <a:rPr lang="en-CA" sz="2800" dirty="0" err="1" smtClean="0">
+                  <a:rPr lang="en-CA" sz="2800" dirty="0" err="1">
                     <a:solidFill>
                       <a:schemeClr val="accent2"/>
                     </a:solidFill>
@@ -18147,7 +17428,7 @@
                   <a:t>Y</a:t>
                 </a:r>
                 <a:r>
-                  <a:rPr lang="en-CA" sz="2800" baseline="-25000" dirty="0" err="1" smtClean="0">
+                  <a:rPr lang="en-CA" sz="2800" baseline="-25000" dirty="0" err="1">
                     <a:solidFill>
                       <a:schemeClr val="accent2"/>
                     </a:solidFill>
@@ -18155,7 +17436,7 @@
                   <a:t>n</a:t>
                 </a:r>
                 <a:r>
-                  <a:rPr lang="en-CA" sz="2800" dirty="0" smtClean="0">
+                  <a:rPr lang="en-CA" sz="2800" dirty="0">
                     <a:solidFill>
                       <a:schemeClr val="tx1"/>
                     </a:solidFill>
@@ -18163,18 +17444,13 @@
                   <a:t> to node </a:t>
                 </a:r>
                 <a:r>
-                  <a:rPr lang="en-CA" sz="2800" dirty="0" smtClean="0">
+                  <a:rPr lang="en-CA" sz="2800" dirty="0">
                     <a:solidFill>
                       <a:schemeClr val="accent2"/>
                     </a:solidFill>
                   </a:rPr>
                   <a:t>X</a:t>
                 </a:r>
-                <a:endParaRPr lang="en-CA" sz="2800" dirty="0">
-                  <a:solidFill>
-                    <a:schemeClr val="accent2"/>
-                  </a:solidFill>
-                </a:endParaRPr>
               </a:p>
               <a:p>
                 <a:endParaRPr lang="en-CA" dirty="0"/>
@@ -18220,30 +17496,6 @@
           </p:sp>
         </mc:Fallback>
       </mc:AlternateContent>
-      <p:sp>
-        <p:nvSpPr>
-          <p:cNvPr id="4" name="Date Placeholder 3"/>
-          <p:cNvSpPr>
-            <a:spLocks noGrp="1"/>
-          </p:cNvSpPr>
-          <p:nvPr>
-            <p:ph type="dt" sz="half" idx="10"/>
-          </p:nvPr>
-        </p:nvSpPr>
-        <p:spPr/>
-        <p:txBody>
-          <a:bodyPr/>
-          <a:lstStyle/>
-          <a:p>
-            <a:fld id="{F668E4B5-49D5-B048-B5A5-3831D6A375F6}" type="datetime1">
-              <a:rPr lang="en-US" smtClean="0"/>
-              <a:pPr/>
-              <a:t>16-06-14</a:t>
-            </a:fld>
-            <a:endParaRPr lang="en-US"/>
-          </a:p>
-        </p:txBody>
-      </p:sp>
       <p:sp>
         <p:nvSpPr>
           <p:cNvPr id="5" name="Slide Number Placeholder 4"/>
@@ -18360,11 +17612,11 @@
             <a:lstStyle/>
             <a:p>
               <a:r>
-                <a:rPr lang="en-US" dirty="0" smtClean="0"/>
+                <a:rPr lang="en-US" dirty="0"/>
                 <a:t>Y</a:t>
               </a:r>
               <a:r>
-                <a:rPr lang="en-US" baseline="-25000" dirty="0" smtClean="0"/>
+                <a:rPr lang="en-US" baseline="-25000" dirty="0"/>
                 <a:t>1</a:t>
               </a:r>
               <a:endParaRPr lang="en-US" dirty="0"/>
@@ -18406,11 +17658,11 @@
             <a:lstStyle/>
             <a:p>
               <a:r>
-                <a:rPr lang="en-US" dirty="0" err="1" smtClean="0"/>
+                <a:rPr lang="en-US" dirty="0" err="1"/>
                 <a:t>Y</a:t>
               </a:r>
               <a:r>
-                <a:rPr lang="en-US" baseline="-25000" dirty="0" err="1" smtClean="0"/>
+                <a:rPr lang="en-US" baseline="-25000" dirty="0" err="1"/>
                 <a:t>n</a:t>
               </a:r>
               <a:endParaRPr lang="en-US" dirty="0"/>
@@ -18452,10 +17704,9 @@
             <a:lstStyle/>
             <a:p>
               <a:r>
-                <a:rPr lang="en-US" dirty="0" smtClean="0"/>
+                <a:rPr lang="en-US" dirty="0"/>
                 <a:t>…</a:t>
               </a:r>
-              <a:endParaRPr lang="en-US" dirty="0"/>
             </a:p>
           </p:txBody>
         </p:sp>
@@ -18533,7 +17784,7 @@
   <p:timing>
     <p:tnLst>
       <p:par>
-        <p:cTn xmlns:p14="http://schemas.microsoft.com/office/powerpoint/2010/main" id="1" dur="indefinite" restart="never" nodeType="tmRoot">
+        <p:cTn id="1" dur="indefinite" restart="never" nodeType="tmRoot">
           <p:childTnLst>
             <p:seq concurrent="1" nextAc="seek">
               <p:cTn id="2" dur="indefinite" nodeType="mainSeq">

</xml_diff>

<commit_message>
clean up cfg1 slides
</commit_message>
<xml_diff>
--- a/assets/ppt/cfg/cfg1-intro.pptx
+++ b/assets/ppt/cfg/cfg1-intro.pptx
@@ -1777,7 +1777,7 @@
             <a:fld id="{BB10D2A1-AA16-124C-8724-E871FC52E9A7}" type="datetime1">
               <a:rPr lang="en-US"/>
               <a:pPr/>
-              <a:t>5/29/19</a:t>
+              <a:t>5/30/19</a:t>
             </a:fld>
             <a:endParaRPr lang="en-US"/>
           </a:p>
@@ -1972,7 +1972,7 @@
             <a:fld id="{1785DF61-96F8-3448-B30E-7E61CA41DDB4}" type="datetime1">
               <a:rPr lang="en-US"/>
               <a:pPr/>
-              <a:t>5/29/19</a:t>
+              <a:t>5/30/19</a:t>
             </a:fld>
             <a:endParaRPr lang="en-US"/>
           </a:p>
@@ -2177,7 +2177,7 @@
             <a:fld id="{B00C37A4-5AA0-6C4C-B4C1-05BACFD89896}" type="datetime1">
               <a:rPr lang="en-US"/>
               <a:pPr/>
-              <a:t>5/29/19</a:t>
+              <a:t>5/30/19</a:t>
             </a:fld>
             <a:endParaRPr lang="en-US"/>
           </a:p>
@@ -2553,7 +2553,7 @@
             <a:fld id="{7ACDE087-5547-9146-A44C-F12479CD90F2}" type="datetime1">
               <a:rPr lang="en-US"/>
               <a:pPr/>
-              <a:t>5/29/19</a:t>
+              <a:t>5/30/19</a:t>
             </a:fld>
             <a:endParaRPr lang="en-US"/>
           </a:p>
@@ -2866,7 +2866,7 @@
             <a:fld id="{ABC23590-A601-0D4E-8E81-4963D950E64C}" type="datetime1">
               <a:rPr lang="en-US"/>
               <a:pPr/>
-              <a:t>5/29/19</a:t>
+              <a:t>5/30/19</a:t>
             </a:fld>
             <a:endParaRPr lang="en-US"/>
           </a:p>
@@ -3318,7 +3318,7 @@
             <a:fld id="{F80D6EEA-C880-B74F-9033-821B2613D0DA}" type="datetime1">
               <a:rPr lang="en-US"/>
               <a:pPr/>
-              <a:t>5/29/19</a:t>
+              <a:t>5/30/19</a:t>
             </a:fld>
             <a:endParaRPr lang="en-US"/>
           </a:p>
@@ -3461,7 +3461,7 @@
             <a:fld id="{D67FB90A-5A86-AA47-9DF5-D4B51CBF5733}" type="datetime1">
               <a:rPr lang="en-US"/>
               <a:pPr/>
-              <a:t>5/29/19</a:t>
+              <a:t>5/30/19</a:t>
             </a:fld>
             <a:endParaRPr lang="en-US"/>
           </a:p>
@@ -3581,7 +3581,7 @@
             <a:fld id="{19D5CE67-D7FF-1A43-B8C8-8AC2D455325E}" type="datetime1">
               <a:rPr lang="en-US"/>
               <a:pPr/>
-              <a:t>5/29/19</a:t>
+              <a:t>5/30/19</a:t>
             </a:fld>
             <a:endParaRPr lang="en-US"/>
           </a:p>
@@ -3883,7 +3883,7 @@
             <a:fld id="{8FB6C99C-CAE9-4A46-8B93-5F7F7EFB4D77}" type="datetime1">
               <a:rPr lang="en-US"/>
               <a:pPr/>
-              <a:t>5/29/19</a:t>
+              <a:t>5/30/19</a:t>
             </a:fld>
             <a:endParaRPr lang="en-US"/>
           </a:p>
@@ -4161,7 +4161,7 @@
             <a:fld id="{E16CD525-494F-8149-9830-A66ADF4FE65A}" type="datetime1">
               <a:rPr lang="en-US"/>
               <a:pPr/>
-              <a:t>5/29/19</a:t>
+              <a:t>5/30/19</a:t>
             </a:fld>
             <a:endParaRPr lang="en-US"/>
           </a:p>

</xml_diff>